<commit_message>
small graphical change to "isPartOf"
</commit_message>
<xml_diff>
--- a/docs/DesignDocument-models.pptx
+++ b/docs/DesignDocument-models.pptx
@@ -1,20 +1,115 @@
 
 <file path=ppt/presentation.xml><?xml version="1.0" encoding="utf-8"?>
-<p:presentation xmlns:a="http://schemas.openxmlformats.org/drawingml/2006/main" xmlns:p="http://schemas.openxmlformats.org/presentationml/2006/main" xmlns:r="http://schemas.openxmlformats.org/officeDocument/2006/relationships">
+<p:presentation xmlns:a="http://schemas.openxmlformats.org/drawingml/2006/main" xmlns:r="http://schemas.openxmlformats.org/officeDocument/2006/relationships" xmlns:p="http://schemas.openxmlformats.org/presentationml/2006/main">
   <p:sldMasterIdLst>
-    <p:sldMasterId id="2147483648" r:id="rId2"/>
-    <p:sldMasterId id="2147483661" r:id="rId3"/>
+    <p:sldMasterId id="2147483648" r:id="rId1"/>
+    <p:sldMasterId id="2147483661" r:id="rId2"/>
   </p:sldMasterIdLst>
   <p:sldIdLst>
-    <p:sldId id="256" r:id="rId4"/>
+    <p:sldId id="256" r:id="rId3"/>
   </p:sldIdLst>
   <p:sldSz cx="12344400" cy="8686800"/>
   <p:notesSz cx="7772400" cy="10058400"/>
+  <p:defaultTextStyle>
+    <a:defPPr>
+      <a:defRPr lang="en-US"/>
+    </a:defPPr>
+    <a:lvl1pPr marL="0" algn="l" defTabSz="914400" rtl="0" eaLnBrk="1" latinLnBrk="0" hangingPunct="1">
+      <a:defRPr sz="1800" kern="1200">
+        <a:solidFill>
+          <a:schemeClr val="tx1"/>
+        </a:solidFill>
+        <a:latin typeface="+mn-lt"/>
+        <a:ea typeface="+mn-ea"/>
+        <a:cs typeface="+mn-cs"/>
+      </a:defRPr>
+    </a:lvl1pPr>
+    <a:lvl2pPr marL="457200" algn="l" defTabSz="914400" rtl="0" eaLnBrk="1" latinLnBrk="0" hangingPunct="1">
+      <a:defRPr sz="1800" kern="1200">
+        <a:solidFill>
+          <a:schemeClr val="tx1"/>
+        </a:solidFill>
+        <a:latin typeface="+mn-lt"/>
+        <a:ea typeface="+mn-ea"/>
+        <a:cs typeface="+mn-cs"/>
+      </a:defRPr>
+    </a:lvl2pPr>
+    <a:lvl3pPr marL="914400" algn="l" defTabSz="914400" rtl="0" eaLnBrk="1" latinLnBrk="0" hangingPunct="1">
+      <a:defRPr sz="1800" kern="1200">
+        <a:solidFill>
+          <a:schemeClr val="tx1"/>
+        </a:solidFill>
+        <a:latin typeface="+mn-lt"/>
+        <a:ea typeface="+mn-ea"/>
+        <a:cs typeface="+mn-cs"/>
+      </a:defRPr>
+    </a:lvl3pPr>
+    <a:lvl4pPr marL="1371600" algn="l" defTabSz="914400" rtl="0" eaLnBrk="1" latinLnBrk="0" hangingPunct="1">
+      <a:defRPr sz="1800" kern="1200">
+        <a:solidFill>
+          <a:schemeClr val="tx1"/>
+        </a:solidFill>
+        <a:latin typeface="+mn-lt"/>
+        <a:ea typeface="+mn-ea"/>
+        <a:cs typeface="+mn-cs"/>
+      </a:defRPr>
+    </a:lvl4pPr>
+    <a:lvl5pPr marL="1828800" algn="l" defTabSz="914400" rtl="0" eaLnBrk="1" latinLnBrk="0" hangingPunct="1">
+      <a:defRPr sz="1800" kern="1200">
+        <a:solidFill>
+          <a:schemeClr val="tx1"/>
+        </a:solidFill>
+        <a:latin typeface="+mn-lt"/>
+        <a:ea typeface="+mn-ea"/>
+        <a:cs typeface="+mn-cs"/>
+      </a:defRPr>
+    </a:lvl5pPr>
+    <a:lvl6pPr marL="2286000" algn="l" defTabSz="914400" rtl="0" eaLnBrk="1" latinLnBrk="0" hangingPunct="1">
+      <a:defRPr sz="1800" kern="1200">
+        <a:solidFill>
+          <a:schemeClr val="tx1"/>
+        </a:solidFill>
+        <a:latin typeface="+mn-lt"/>
+        <a:ea typeface="+mn-ea"/>
+        <a:cs typeface="+mn-cs"/>
+      </a:defRPr>
+    </a:lvl6pPr>
+    <a:lvl7pPr marL="2743200" algn="l" defTabSz="914400" rtl="0" eaLnBrk="1" latinLnBrk="0" hangingPunct="1">
+      <a:defRPr sz="1800" kern="1200">
+        <a:solidFill>
+          <a:schemeClr val="tx1"/>
+        </a:solidFill>
+        <a:latin typeface="+mn-lt"/>
+        <a:ea typeface="+mn-ea"/>
+        <a:cs typeface="+mn-cs"/>
+      </a:defRPr>
+    </a:lvl7pPr>
+    <a:lvl8pPr marL="3200400" algn="l" defTabSz="914400" rtl="0" eaLnBrk="1" latinLnBrk="0" hangingPunct="1">
+      <a:defRPr sz="1800" kern="1200">
+        <a:solidFill>
+          <a:schemeClr val="tx1"/>
+        </a:solidFill>
+        <a:latin typeface="+mn-lt"/>
+        <a:ea typeface="+mn-ea"/>
+        <a:cs typeface="+mn-cs"/>
+      </a:defRPr>
+    </a:lvl8pPr>
+    <a:lvl9pPr marL="3657600" algn="l" defTabSz="914400" rtl="0" eaLnBrk="1" latinLnBrk="0" hangingPunct="1">
+      <a:defRPr sz="1800" kern="1200">
+        <a:solidFill>
+          <a:schemeClr val="tx1"/>
+        </a:solidFill>
+        <a:latin typeface="+mn-lt"/>
+        <a:ea typeface="+mn-ea"/>
+        <a:cs typeface="+mn-cs"/>
+      </a:defRPr>
+    </a:lvl9pPr>
+  </p:defaultTextStyle>
 </p:presentation>
 </file>
 
 <file path=ppt/slideLayouts/slideLayout1.xml><?xml version="1.0" encoding="utf-8"?>
-<p:sldLayout xmlns:a="http://schemas.openxmlformats.org/drawingml/2006/main" xmlns:p="http://schemas.openxmlformats.org/presentationml/2006/main" xmlns:r="http://schemas.openxmlformats.org/officeDocument/2006/relationships" preserve="1" type="blank">
+<p:sldLayout xmlns:a="http://schemas.openxmlformats.org/drawingml/2006/main" xmlns:r="http://schemas.openxmlformats.org/officeDocument/2006/relationships" xmlns:p="http://schemas.openxmlformats.org/presentationml/2006/main" type="blank" preserve="1">
   <p:cSld name="Blank Slide">
     <p:spTree>
       <p:nvGrpSpPr>
@@ -32,11 +127,14 @@
       </p:grpSpPr>
     </p:spTree>
   </p:cSld>
+  <p:clrMapOvr>
+    <a:masterClrMapping/>
+  </p:clrMapOvr>
 </p:sldLayout>
 </file>
 
 <file path=ppt/slideLayouts/slideLayout10.xml><?xml version="1.0" encoding="utf-8"?>
-<p:sldLayout xmlns:a="http://schemas.openxmlformats.org/drawingml/2006/main" xmlns:p="http://schemas.openxmlformats.org/presentationml/2006/main" xmlns:r="http://schemas.openxmlformats.org/officeDocument/2006/relationships" preserve="1" type="objOverTx">
+<p:sldLayout xmlns:a="http://schemas.openxmlformats.org/drawingml/2006/main" xmlns:r="http://schemas.openxmlformats.org/officeDocument/2006/relationships" xmlns:p="http://schemas.openxmlformats.org/presentationml/2006/main" type="objOverTx" preserve="1">
   <p:cSld name="Title, Content over Content">
     <p:spTree>
       <p:nvGrpSpPr>
@@ -72,7 +170,8 @@
           </a:prstGeom>
         </p:spPr>
         <p:txBody>
-          <a:bodyPr anchor="ctr" bIns="0" lIns="0" rIns="0" tIns="0" wrap="none"/>
+          <a:bodyPr wrap="none" lIns="0" tIns="0" rIns="0" bIns="0" anchor="ctr"/>
+          <a:lstStyle/>
           <a:p>
             <a:endParaRPr/>
           </a:p>
@@ -98,7 +197,8 @@
           </a:prstGeom>
         </p:spPr>
         <p:txBody>
-          <a:bodyPr bIns="0" lIns="0" rIns="0" tIns="0" wrap="none"/>
+          <a:bodyPr wrap="none" lIns="0" tIns="0" rIns="0" bIns="0"/>
+          <a:lstStyle/>
           <a:p>
             <a:endParaRPr/>
           </a:p>
@@ -124,7 +224,8 @@
           </a:prstGeom>
         </p:spPr>
         <p:txBody>
-          <a:bodyPr bIns="0" lIns="0" rIns="0" tIns="0" wrap="none"/>
+          <a:bodyPr wrap="none" lIns="0" tIns="0" rIns="0" bIns="0"/>
+          <a:lstStyle/>
           <a:p>
             <a:endParaRPr/>
           </a:p>
@@ -132,11 +233,14 @@
       </p:sp>
     </p:spTree>
   </p:cSld>
+  <p:clrMapOvr>
+    <a:masterClrMapping/>
+  </p:clrMapOvr>
 </p:sldLayout>
 </file>
 
 <file path=ppt/slideLayouts/slideLayout11.xml><?xml version="1.0" encoding="utf-8"?>
-<p:sldLayout xmlns:a="http://schemas.openxmlformats.org/drawingml/2006/main" xmlns:p="http://schemas.openxmlformats.org/presentationml/2006/main" xmlns:r="http://schemas.openxmlformats.org/officeDocument/2006/relationships" preserve="1" type="fourObj">
+<p:sldLayout xmlns:a="http://schemas.openxmlformats.org/drawingml/2006/main" xmlns:r="http://schemas.openxmlformats.org/officeDocument/2006/relationships" xmlns:p="http://schemas.openxmlformats.org/presentationml/2006/main" type="fourObj" preserve="1">
   <p:cSld name="Title, 4 Content">
     <p:spTree>
       <p:nvGrpSpPr>
@@ -172,7 +276,8 @@
           </a:prstGeom>
         </p:spPr>
         <p:txBody>
-          <a:bodyPr anchor="ctr" bIns="0" lIns="0" rIns="0" tIns="0" wrap="none"/>
+          <a:bodyPr wrap="none" lIns="0" tIns="0" rIns="0" bIns="0" anchor="ctr"/>
+          <a:lstStyle/>
           <a:p>
             <a:endParaRPr/>
           </a:p>
@@ -198,7 +303,8 @@
           </a:prstGeom>
         </p:spPr>
         <p:txBody>
-          <a:bodyPr bIns="0" lIns="0" rIns="0" tIns="0" wrap="none"/>
+          <a:bodyPr wrap="none" lIns="0" tIns="0" rIns="0" bIns="0"/>
+          <a:lstStyle/>
           <a:p>
             <a:endParaRPr/>
           </a:p>
@@ -224,7 +330,8 @@
           </a:prstGeom>
         </p:spPr>
         <p:txBody>
-          <a:bodyPr bIns="0" lIns="0" rIns="0" tIns="0" wrap="none"/>
+          <a:bodyPr wrap="none" lIns="0" tIns="0" rIns="0" bIns="0"/>
+          <a:lstStyle/>
           <a:p>
             <a:endParaRPr/>
           </a:p>
@@ -250,7 +357,8 @@
           </a:prstGeom>
         </p:spPr>
         <p:txBody>
-          <a:bodyPr bIns="0" lIns="0" rIns="0" tIns="0" wrap="none"/>
+          <a:bodyPr wrap="none" lIns="0" tIns="0" rIns="0" bIns="0"/>
+          <a:lstStyle/>
           <a:p>
             <a:endParaRPr/>
           </a:p>
@@ -276,7 +384,8 @@
           </a:prstGeom>
         </p:spPr>
         <p:txBody>
-          <a:bodyPr bIns="0" lIns="0" rIns="0" tIns="0" wrap="none"/>
+          <a:bodyPr wrap="none" lIns="0" tIns="0" rIns="0" bIns="0"/>
+          <a:lstStyle/>
           <a:p>
             <a:endParaRPr/>
           </a:p>
@@ -284,11 +393,14 @@
       </p:sp>
     </p:spTree>
   </p:cSld>
+  <p:clrMapOvr>
+    <a:masterClrMapping/>
+  </p:clrMapOvr>
 </p:sldLayout>
 </file>
 
 <file path=ppt/slideLayouts/slideLayout12.xml><?xml version="1.0" encoding="utf-8"?>
-<p:sldLayout xmlns:a="http://schemas.openxmlformats.org/drawingml/2006/main" xmlns:p="http://schemas.openxmlformats.org/presentationml/2006/main" xmlns:r="http://schemas.openxmlformats.org/officeDocument/2006/relationships" preserve="1" type="blank">
+<p:sldLayout xmlns:a="http://schemas.openxmlformats.org/drawingml/2006/main" xmlns:r="http://schemas.openxmlformats.org/officeDocument/2006/relationships" xmlns:p="http://schemas.openxmlformats.org/presentationml/2006/main" type="blank" preserve="1">
   <p:cSld name="Title, 6 Content">
     <p:spTree>
       <p:nvGrpSpPr>
@@ -324,7 +436,8 @@
           </a:prstGeom>
         </p:spPr>
         <p:txBody>
-          <a:bodyPr anchor="ctr" bIns="0" lIns="0" rIns="0" tIns="0" wrap="none"/>
+          <a:bodyPr wrap="none" lIns="0" tIns="0" rIns="0" bIns="0" anchor="ctr"/>
+          <a:lstStyle/>
           <a:p>
             <a:endParaRPr/>
           </a:p>
@@ -350,7 +463,8 @@
           </a:prstGeom>
         </p:spPr>
         <p:txBody>
-          <a:bodyPr bIns="0" lIns="0" rIns="0" tIns="0" wrap="none"/>
+          <a:bodyPr wrap="none" lIns="0" tIns="0" rIns="0" bIns="0"/>
+          <a:lstStyle/>
           <a:p>
             <a:endParaRPr/>
           </a:p>
@@ -376,7 +490,8 @@
           </a:prstGeom>
         </p:spPr>
         <p:txBody>
-          <a:bodyPr bIns="0" lIns="0" rIns="0" tIns="0" wrap="none"/>
+          <a:bodyPr wrap="none" lIns="0" tIns="0" rIns="0" bIns="0"/>
+          <a:lstStyle/>
           <a:p>
             <a:endParaRPr/>
           </a:p>
@@ -384,7 +499,7 @@
       </p:sp>
       <p:pic>
         <p:nvPicPr>
-          <p:cNvPr descr="" id="37" name=""/>
+          <p:cNvPr id="37" name="Picture 36"/>
           <p:cNvPicPr/>
           <p:nvPr/>
         </p:nvPicPr>
@@ -409,12 +524,12 @@
       </p:pic>
       <p:pic>
         <p:nvPicPr>
-          <p:cNvPr descr="" id="38" name=""/>
+          <p:cNvPr id="38" name="Picture 37"/>
           <p:cNvPicPr/>
           <p:nvPr/>
         </p:nvPicPr>
         <p:blipFill>
-          <a:blip r:embed="rId3"/>
+          <a:blip r:embed="rId2"/>
           <a:stretch>
             <a:fillRect/>
           </a:stretch>
@@ -434,11 +549,14 @@
       </p:pic>
     </p:spTree>
   </p:cSld>
+  <p:clrMapOvr>
+    <a:masterClrMapping/>
+  </p:clrMapOvr>
 </p:sldLayout>
 </file>
 
 <file path=ppt/slideLayouts/slideLayout13.xml><?xml version="1.0" encoding="utf-8"?>
-<p:sldLayout xmlns:a="http://schemas.openxmlformats.org/drawingml/2006/main" xmlns:p="http://schemas.openxmlformats.org/presentationml/2006/main" xmlns:r="http://schemas.openxmlformats.org/officeDocument/2006/relationships" preserve="1" type="blank">
+<p:sldLayout xmlns:a="http://schemas.openxmlformats.org/drawingml/2006/main" xmlns:r="http://schemas.openxmlformats.org/officeDocument/2006/relationships" xmlns:p="http://schemas.openxmlformats.org/presentationml/2006/main" type="blank" preserve="1">
   <p:cSld name="Blank Slide">
     <p:spTree>
       <p:nvGrpSpPr>
@@ -456,11 +574,14 @@
       </p:grpSpPr>
     </p:spTree>
   </p:cSld>
+  <p:clrMapOvr>
+    <a:masterClrMapping/>
+  </p:clrMapOvr>
 </p:sldLayout>
 </file>
 
 <file path=ppt/slideLayouts/slideLayout14.xml><?xml version="1.0" encoding="utf-8"?>
-<p:sldLayout xmlns:a="http://schemas.openxmlformats.org/drawingml/2006/main" xmlns:p="http://schemas.openxmlformats.org/presentationml/2006/main" xmlns:r="http://schemas.openxmlformats.org/officeDocument/2006/relationships" preserve="1" type="tx">
+<p:sldLayout xmlns:a="http://schemas.openxmlformats.org/drawingml/2006/main" xmlns:r="http://schemas.openxmlformats.org/officeDocument/2006/relationships" xmlns:p="http://schemas.openxmlformats.org/presentationml/2006/main" type="tx" preserve="1">
   <p:cSld name="Title Slide">
     <p:spTree>
       <p:nvGrpSpPr>
@@ -496,7 +617,8 @@
           </a:prstGeom>
         </p:spPr>
         <p:txBody>
-          <a:bodyPr anchor="ctr" bIns="0" lIns="0" rIns="0" tIns="0" wrap="none"/>
+          <a:bodyPr wrap="none" lIns="0" tIns="0" rIns="0" bIns="0" anchor="ctr"/>
+          <a:lstStyle/>
           <a:p>
             <a:endParaRPr/>
           </a:p>
@@ -522,7 +644,8 @@
           </a:prstGeom>
         </p:spPr>
         <p:txBody>
-          <a:bodyPr anchor="ctr" bIns="0" lIns="0" rIns="0" tIns="0" wrap="none"/>
+          <a:bodyPr wrap="none" lIns="0" tIns="0" rIns="0" bIns="0" anchor="ctr"/>
+          <a:lstStyle/>
           <a:p>
             <a:pPr algn="ctr"/>
             <a:endParaRPr/>
@@ -531,11 +654,14 @@
       </p:sp>
     </p:spTree>
   </p:cSld>
+  <p:clrMapOvr>
+    <a:masterClrMapping/>
+  </p:clrMapOvr>
 </p:sldLayout>
 </file>
 
 <file path=ppt/slideLayouts/slideLayout15.xml><?xml version="1.0" encoding="utf-8"?>
-<p:sldLayout xmlns:a="http://schemas.openxmlformats.org/drawingml/2006/main" xmlns:p="http://schemas.openxmlformats.org/presentationml/2006/main" xmlns:r="http://schemas.openxmlformats.org/officeDocument/2006/relationships" preserve="1" type="obj">
+<p:sldLayout xmlns:a="http://schemas.openxmlformats.org/drawingml/2006/main" xmlns:r="http://schemas.openxmlformats.org/officeDocument/2006/relationships" xmlns:p="http://schemas.openxmlformats.org/presentationml/2006/main" type="obj" preserve="1">
   <p:cSld name="Title, Content">
     <p:spTree>
       <p:nvGrpSpPr>
@@ -571,7 +697,8 @@
           </a:prstGeom>
         </p:spPr>
         <p:txBody>
-          <a:bodyPr anchor="ctr" bIns="0" lIns="0" rIns="0" tIns="0" wrap="none"/>
+          <a:bodyPr wrap="none" lIns="0" tIns="0" rIns="0" bIns="0" anchor="ctr"/>
+          <a:lstStyle/>
           <a:p>
             <a:endParaRPr/>
           </a:p>
@@ -597,7 +724,8 @@
           </a:prstGeom>
         </p:spPr>
         <p:txBody>
-          <a:bodyPr bIns="0" lIns="0" rIns="0" tIns="0" wrap="none"/>
+          <a:bodyPr wrap="none" lIns="0" tIns="0" rIns="0" bIns="0"/>
+          <a:lstStyle/>
           <a:p>
             <a:endParaRPr/>
           </a:p>
@@ -605,11 +733,14 @@
       </p:sp>
     </p:spTree>
   </p:cSld>
+  <p:clrMapOvr>
+    <a:masterClrMapping/>
+  </p:clrMapOvr>
 </p:sldLayout>
 </file>
 
 <file path=ppt/slideLayouts/slideLayout16.xml><?xml version="1.0" encoding="utf-8"?>
-<p:sldLayout xmlns:a="http://schemas.openxmlformats.org/drawingml/2006/main" xmlns:p="http://schemas.openxmlformats.org/presentationml/2006/main" xmlns:r="http://schemas.openxmlformats.org/officeDocument/2006/relationships" preserve="1" type="twoObj">
+<p:sldLayout xmlns:a="http://schemas.openxmlformats.org/drawingml/2006/main" xmlns:r="http://schemas.openxmlformats.org/officeDocument/2006/relationships" xmlns:p="http://schemas.openxmlformats.org/presentationml/2006/main" type="twoObj" preserve="1">
   <p:cSld name="Title, 2 Content">
     <p:spTree>
       <p:nvGrpSpPr>
@@ -645,7 +776,8 @@
           </a:prstGeom>
         </p:spPr>
         <p:txBody>
-          <a:bodyPr anchor="ctr" bIns="0" lIns="0" rIns="0" tIns="0" wrap="none"/>
+          <a:bodyPr wrap="none" lIns="0" tIns="0" rIns="0" bIns="0" anchor="ctr"/>
+          <a:lstStyle/>
           <a:p>
             <a:endParaRPr/>
           </a:p>
@@ -671,7 +803,8 @@
           </a:prstGeom>
         </p:spPr>
         <p:txBody>
-          <a:bodyPr bIns="0" lIns="0" rIns="0" tIns="0" wrap="none"/>
+          <a:bodyPr wrap="none" lIns="0" tIns="0" rIns="0" bIns="0"/>
+          <a:lstStyle/>
           <a:p>
             <a:endParaRPr/>
           </a:p>
@@ -697,7 +830,8 @@
           </a:prstGeom>
         </p:spPr>
         <p:txBody>
-          <a:bodyPr bIns="0" lIns="0" rIns="0" tIns="0" wrap="none"/>
+          <a:bodyPr wrap="none" lIns="0" tIns="0" rIns="0" bIns="0"/>
+          <a:lstStyle/>
           <a:p>
             <a:endParaRPr/>
           </a:p>
@@ -705,11 +839,14 @@
       </p:sp>
     </p:spTree>
   </p:cSld>
+  <p:clrMapOvr>
+    <a:masterClrMapping/>
+  </p:clrMapOvr>
 </p:sldLayout>
 </file>
 
 <file path=ppt/slideLayouts/slideLayout17.xml><?xml version="1.0" encoding="utf-8"?>
-<p:sldLayout xmlns:a="http://schemas.openxmlformats.org/drawingml/2006/main" xmlns:p="http://schemas.openxmlformats.org/presentationml/2006/main" xmlns:r="http://schemas.openxmlformats.org/officeDocument/2006/relationships" preserve="1" type="titleOnly">
+<p:sldLayout xmlns:a="http://schemas.openxmlformats.org/drawingml/2006/main" xmlns:r="http://schemas.openxmlformats.org/officeDocument/2006/relationships" xmlns:p="http://schemas.openxmlformats.org/presentationml/2006/main" type="titleOnly" preserve="1">
   <p:cSld name="Title Only">
     <p:spTree>
       <p:nvGrpSpPr>
@@ -745,7 +882,8 @@
           </a:prstGeom>
         </p:spPr>
         <p:txBody>
-          <a:bodyPr anchor="ctr" bIns="0" lIns="0" rIns="0" tIns="0" wrap="none"/>
+          <a:bodyPr wrap="none" lIns="0" tIns="0" rIns="0" bIns="0" anchor="ctr"/>
+          <a:lstStyle/>
           <a:p>
             <a:endParaRPr/>
           </a:p>
@@ -753,11 +891,14 @@
       </p:sp>
     </p:spTree>
   </p:cSld>
+  <p:clrMapOvr>
+    <a:masterClrMapping/>
+  </p:clrMapOvr>
 </p:sldLayout>
 </file>
 
 <file path=ppt/slideLayouts/slideLayout18.xml><?xml version="1.0" encoding="utf-8"?>
-<p:sldLayout xmlns:a="http://schemas.openxmlformats.org/drawingml/2006/main" xmlns:p="http://schemas.openxmlformats.org/presentationml/2006/main" xmlns:r="http://schemas.openxmlformats.org/officeDocument/2006/relationships" preserve="1" type="objOnly">
+<p:sldLayout xmlns:a="http://schemas.openxmlformats.org/drawingml/2006/main" xmlns:r="http://schemas.openxmlformats.org/officeDocument/2006/relationships" xmlns:p="http://schemas.openxmlformats.org/presentationml/2006/main" type="objOnly" preserve="1">
   <p:cSld name="Centered Text">
     <p:spTree>
       <p:nvGrpSpPr>
@@ -793,7 +934,8 @@
           </a:prstGeom>
         </p:spPr>
         <p:txBody>
-          <a:bodyPr anchor="ctr" bIns="0" lIns="0" rIns="0" tIns="0" wrap="none"/>
+          <a:bodyPr wrap="none" lIns="0" tIns="0" rIns="0" bIns="0" anchor="ctr"/>
+          <a:lstStyle/>
           <a:p>
             <a:pPr algn="ctr"/>
             <a:endParaRPr/>
@@ -802,11 +944,14 @@
       </p:sp>
     </p:spTree>
   </p:cSld>
+  <p:clrMapOvr>
+    <a:masterClrMapping/>
+  </p:clrMapOvr>
 </p:sldLayout>
 </file>
 
 <file path=ppt/slideLayouts/slideLayout19.xml><?xml version="1.0" encoding="utf-8"?>
-<p:sldLayout xmlns:a="http://schemas.openxmlformats.org/drawingml/2006/main" xmlns:p="http://schemas.openxmlformats.org/presentationml/2006/main" xmlns:r="http://schemas.openxmlformats.org/officeDocument/2006/relationships" preserve="1" type="twoObjAndObj">
+<p:sldLayout xmlns:a="http://schemas.openxmlformats.org/drawingml/2006/main" xmlns:r="http://schemas.openxmlformats.org/officeDocument/2006/relationships" xmlns:p="http://schemas.openxmlformats.org/presentationml/2006/main" type="twoObjAndObj" preserve="1">
   <p:cSld name="Title, 2 Content and Content">
     <p:spTree>
       <p:nvGrpSpPr>
@@ -842,7 +987,8 @@
           </a:prstGeom>
         </p:spPr>
         <p:txBody>
-          <a:bodyPr anchor="ctr" bIns="0" lIns="0" rIns="0" tIns="0" wrap="none"/>
+          <a:bodyPr wrap="none" lIns="0" tIns="0" rIns="0" bIns="0" anchor="ctr"/>
+          <a:lstStyle/>
           <a:p>
             <a:endParaRPr/>
           </a:p>
@@ -868,7 +1014,8 @@
           </a:prstGeom>
         </p:spPr>
         <p:txBody>
-          <a:bodyPr bIns="0" lIns="0" rIns="0" tIns="0" wrap="none"/>
+          <a:bodyPr wrap="none" lIns="0" tIns="0" rIns="0" bIns="0"/>
+          <a:lstStyle/>
           <a:p>
             <a:endParaRPr/>
           </a:p>
@@ -894,7 +1041,8 @@
           </a:prstGeom>
         </p:spPr>
         <p:txBody>
-          <a:bodyPr bIns="0" lIns="0" rIns="0" tIns="0" wrap="none"/>
+          <a:bodyPr wrap="none" lIns="0" tIns="0" rIns="0" bIns="0"/>
+          <a:lstStyle/>
           <a:p>
             <a:endParaRPr/>
           </a:p>
@@ -920,7 +1068,8 @@
           </a:prstGeom>
         </p:spPr>
         <p:txBody>
-          <a:bodyPr bIns="0" lIns="0" rIns="0" tIns="0" wrap="none"/>
+          <a:bodyPr wrap="none" lIns="0" tIns="0" rIns="0" bIns="0"/>
+          <a:lstStyle/>
           <a:p>
             <a:endParaRPr/>
           </a:p>
@@ -928,11 +1077,14 @@
       </p:sp>
     </p:spTree>
   </p:cSld>
+  <p:clrMapOvr>
+    <a:masterClrMapping/>
+  </p:clrMapOvr>
 </p:sldLayout>
 </file>
 
 <file path=ppt/slideLayouts/slideLayout2.xml><?xml version="1.0" encoding="utf-8"?>
-<p:sldLayout xmlns:a="http://schemas.openxmlformats.org/drawingml/2006/main" xmlns:p="http://schemas.openxmlformats.org/presentationml/2006/main" xmlns:r="http://schemas.openxmlformats.org/officeDocument/2006/relationships" preserve="1" type="tx">
+<p:sldLayout xmlns:a="http://schemas.openxmlformats.org/drawingml/2006/main" xmlns:r="http://schemas.openxmlformats.org/officeDocument/2006/relationships" xmlns:p="http://schemas.openxmlformats.org/presentationml/2006/main" type="tx" preserve="1">
   <p:cSld name="Title Slide">
     <p:spTree>
       <p:nvGrpSpPr>
@@ -968,7 +1120,8 @@
           </a:prstGeom>
         </p:spPr>
         <p:txBody>
-          <a:bodyPr anchor="ctr" bIns="0" lIns="0" rIns="0" tIns="0" wrap="none"/>
+          <a:bodyPr wrap="none" lIns="0" tIns="0" rIns="0" bIns="0" anchor="ctr"/>
+          <a:lstStyle/>
           <a:p>
             <a:endParaRPr/>
           </a:p>
@@ -994,7 +1147,8 @@
           </a:prstGeom>
         </p:spPr>
         <p:txBody>
-          <a:bodyPr anchor="ctr" bIns="0" lIns="0" rIns="0" tIns="0" wrap="none"/>
+          <a:bodyPr wrap="none" lIns="0" tIns="0" rIns="0" bIns="0" anchor="ctr"/>
+          <a:lstStyle/>
           <a:p>
             <a:pPr algn="ctr"/>
             <a:endParaRPr/>
@@ -1003,11 +1157,14 @@
       </p:sp>
     </p:spTree>
   </p:cSld>
+  <p:clrMapOvr>
+    <a:masterClrMapping/>
+  </p:clrMapOvr>
 </p:sldLayout>
 </file>
 
 <file path=ppt/slideLayouts/slideLayout20.xml><?xml version="1.0" encoding="utf-8"?>
-<p:sldLayout xmlns:a="http://schemas.openxmlformats.org/drawingml/2006/main" xmlns:p="http://schemas.openxmlformats.org/presentationml/2006/main" xmlns:r="http://schemas.openxmlformats.org/officeDocument/2006/relationships" preserve="1" type="objAndTwoObj">
+<p:sldLayout xmlns:a="http://schemas.openxmlformats.org/drawingml/2006/main" xmlns:r="http://schemas.openxmlformats.org/officeDocument/2006/relationships" xmlns:p="http://schemas.openxmlformats.org/presentationml/2006/main" type="objAndTwoObj" preserve="1">
   <p:cSld name="Title Content and 2 Content">
     <p:spTree>
       <p:nvGrpSpPr>
@@ -1043,7 +1200,8 @@
           </a:prstGeom>
         </p:spPr>
         <p:txBody>
-          <a:bodyPr anchor="ctr" bIns="0" lIns="0" rIns="0" tIns="0" wrap="none"/>
+          <a:bodyPr wrap="none" lIns="0" tIns="0" rIns="0" bIns="0" anchor="ctr"/>
+          <a:lstStyle/>
           <a:p>
             <a:endParaRPr/>
           </a:p>
@@ -1069,7 +1227,8 @@
           </a:prstGeom>
         </p:spPr>
         <p:txBody>
-          <a:bodyPr bIns="0" lIns="0" rIns="0" tIns="0" wrap="none"/>
+          <a:bodyPr wrap="none" lIns="0" tIns="0" rIns="0" bIns="0"/>
+          <a:lstStyle/>
           <a:p>
             <a:endParaRPr/>
           </a:p>
@@ -1095,7 +1254,8 @@
           </a:prstGeom>
         </p:spPr>
         <p:txBody>
-          <a:bodyPr bIns="0" lIns="0" rIns="0" tIns="0" wrap="none"/>
+          <a:bodyPr wrap="none" lIns="0" tIns="0" rIns="0" bIns="0"/>
+          <a:lstStyle/>
           <a:p>
             <a:endParaRPr/>
           </a:p>
@@ -1121,7 +1281,8 @@
           </a:prstGeom>
         </p:spPr>
         <p:txBody>
-          <a:bodyPr bIns="0" lIns="0" rIns="0" tIns="0" wrap="none"/>
+          <a:bodyPr wrap="none" lIns="0" tIns="0" rIns="0" bIns="0"/>
+          <a:lstStyle/>
           <a:p>
             <a:endParaRPr/>
           </a:p>
@@ -1129,11 +1290,14 @@
       </p:sp>
     </p:spTree>
   </p:cSld>
+  <p:clrMapOvr>
+    <a:masterClrMapping/>
+  </p:clrMapOvr>
 </p:sldLayout>
 </file>
 
 <file path=ppt/slideLayouts/slideLayout21.xml><?xml version="1.0" encoding="utf-8"?>
-<p:sldLayout xmlns:a="http://schemas.openxmlformats.org/drawingml/2006/main" xmlns:p="http://schemas.openxmlformats.org/presentationml/2006/main" xmlns:r="http://schemas.openxmlformats.org/officeDocument/2006/relationships" preserve="1" type="twoObjOverTx">
+<p:sldLayout xmlns:a="http://schemas.openxmlformats.org/drawingml/2006/main" xmlns:r="http://schemas.openxmlformats.org/officeDocument/2006/relationships" xmlns:p="http://schemas.openxmlformats.org/presentationml/2006/main" type="twoObjOverTx" preserve="1">
   <p:cSld name="Title, 2 Content over Content">
     <p:spTree>
       <p:nvGrpSpPr>
@@ -1169,7 +1333,8 @@
           </a:prstGeom>
         </p:spPr>
         <p:txBody>
-          <a:bodyPr anchor="ctr" bIns="0" lIns="0" rIns="0" tIns="0" wrap="none"/>
+          <a:bodyPr wrap="none" lIns="0" tIns="0" rIns="0" bIns="0" anchor="ctr"/>
+          <a:lstStyle/>
           <a:p>
             <a:endParaRPr/>
           </a:p>
@@ -1195,7 +1360,8 @@
           </a:prstGeom>
         </p:spPr>
         <p:txBody>
-          <a:bodyPr bIns="0" lIns="0" rIns="0" tIns="0" wrap="none"/>
+          <a:bodyPr wrap="none" lIns="0" tIns="0" rIns="0" bIns="0"/>
+          <a:lstStyle/>
           <a:p>
             <a:endParaRPr/>
           </a:p>
@@ -1221,7 +1387,8 @@
           </a:prstGeom>
         </p:spPr>
         <p:txBody>
-          <a:bodyPr bIns="0" lIns="0" rIns="0" tIns="0" wrap="none"/>
+          <a:bodyPr wrap="none" lIns="0" tIns="0" rIns="0" bIns="0"/>
+          <a:lstStyle/>
           <a:p>
             <a:endParaRPr/>
           </a:p>
@@ -1247,7 +1414,8 @@
           </a:prstGeom>
         </p:spPr>
         <p:txBody>
-          <a:bodyPr bIns="0" lIns="0" rIns="0" tIns="0" wrap="none"/>
+          <a:bodyPr wrap="none" lIns="0" tIns="0" rIns="0" bIns="0"/>
+          <a:lstStyle/>
           <a:p>
             <a:endParaRPr/>
           </a:p>
@@ -1255,11 +1423,14 @@
       </p:sp>
     </p:spTree>
   </p:cSld>
+  <p:clrMapOvr>
+    <a:masterClrMapping/>
+  </p:clrMapOvr>
 </p:sldLayout>
 </file>
 
 <file path=ppt/slideLayouts/slideLayout22.xml><?xml version="1.0" encoding="utf-8"?>
-<p:sldLayout xmlns:a="http://schemas.openxmlformats.org/drawingml/2006/main" xmlns:p="http://schemas.openxmlformats.org/presentationml/2006/main" xmlns:r="http://schemas.openxmlformats.org/officeDocument/2006/relationships" preserve="1" type="objOverTx">
+<p:sldLayout xmlns:a="http://schemas.openxmlformats.org/drawingml/2006/main" xmlns:r="http://schemas.openxmlformats.org/officeDocument/2006/relationships" xmlns:p="http://schemas.openxmlformats.org/presentationml/2006/main" type="objOverTx" preserve="1">
   <p:cSld name="Title, Content over Content">
     <p:spTree>
       <p:nvGrpSpPr>
@@ -1295,7 +1466,8 @@
           </a:prstGeom>
         </p:spPr>
         <p:txBody>
-          <a:bodyPr anchor="ctr" bIns="0" lIns="0" rIns="0" tIns="0" wrap="none"/>
+          <a:bodyPr wrap="none" lIns="0" tIns="0" rIns="0" bIns="0" anchor="ctr"/>
+          <a:lstStyle/>
           <a:p>
             <a:endParaRPr/>
           </a:p>
@@ -1321,7 +1493,8 @@
           </a:prstGeom>
         </p:spPr>
         <p:txBody>
-          <a:bodyPr bIns="0" lIns="0" rIns="0" tIns="0" wrap="none"/>
+          <a:bodyPr wrap="none" lIns="0" tIns="0" rIns="0" bIns="0"/>
+          <a:lstStyle/>
           <a:p>
             <a:endParaRPr/>
           </a:p>
@@ -1347,7 +1520,8 @@
           </a:prstGeom>
         </p:spPr>
         <p:txBody>
-          <a:bodyPr bIns="0" lIns="0" rIns="0" tIns="0" wrap="none"/>
+          <a:bodyPr wrap="none" lIns="0" tIns="0" rIns="0" bIns="0"/>
+          <a:lstStyle/>
           <a:p>
             <a:endParaRPr/>
           </a:p>
@@ -1355,11 +1529,14 @@
       </p:sp>
     </p:spTree>
   </p:cSld>
+  <p:clrMapOvr>
+    <a:masterClrMapping/>
+  </p:clrMapOvr>
 </p:sldLayout>
 </file>
 
 <file path=ppt/slideLayouts/slideLayout23.xml><?xml version="1.0" encoding="utf-8"?>
-<p:sldLayout xmlns:a="http://schemas.openxmlformats.org/drawingml/2006/main" xmlns:p="http://schemas.openxmlformats.org/presentationml/2006/main" xmlns:r="http://schemas.openxmlformats.org/officeDocument/2006/relationships" preserve="1" type="fourObj">
+<p:sldLayout xmlns:a="http://schemas.openxmlformats.org/drawingml/2006/main" xmlns:r="http://schemas.openxmlformats.org/officeDocument/2006/relationships" xmlns:p="http://schemas.openxmlformats.org/presentationml/2006/main" type="fourObj" preserve="1">
   <p:cSld name="Title, 4 Content">
     <p:spTree>
       <p:nvGrpSpPr>
@@ -1395,7 +1572,8 @@
           </a:prstGeom>
         </p:spPr>
         <p:txBody>
-          <a:bodyPr anchor="ctr" bIns="0" lIns="0" rIns="0" tIns="0" wrap="none"/>
+          <a:bodyPr wrap="none" lIns="0" tIns="0" rIns="0" bIns="0" anchor="ctr"/>
+          <a:lstStyle/>
           <a:p>
             <a:endParaRPr/>
           </a:p>
@@ -1421,7 +1599,8 @@
           </a:prstGeom>
         </p:spPr>
         <p:txBody>
-          <a:bodyPr bIns="0" lIns="0" rIns="0" tIns="0" wrap="none"/>
+          <a:bodyPr wrap="none" lIns="0" tIns="0" rIns="0" bIns="0"/>
+          <a:lstStyle/>
           <a:p>
             <a:endParaRPr/>
           </a:p>
@@ -1447,7 +1626,8 @@
           </a:prstGeom>
         </p:spPr>
         <p:txBody>
-          <a:bodyPr bIns="0" lIns="0" rIns="0" tIns="0" wrap="none"/>
+          <a:bodyPr wrap="none" lIns="0" tIns="0" rIns="0" bIns="0"/>
+          <a:lstStyle/>
           <a:p>
             <a:endParaRPr/>
           </a:p>
@@ -1473,7 +1653,8 @@
           </a:prstGeom>
         </p:spPr>
         <p:txBody>
-          <a:bodyPr bIns="0" lIns="0" rIns="0" tIns="0" wrap="none"/>
+          <a:bodyPr wrap="none" lIns="0" tIns="0" rIns="0" bIns="0"/>
+          <a:lstStyle/>
           <a:p>
             <a:endParaRPr/>
           </a:p>
@@ -1499,7 +1680,8 @@
           </a:prstGeom>
         </p:spPr>
         <p:txBody>
-          <a:bodyPr bIns="0" lIns="0" rIns="0" tIns="0" wrap="none"/>
+          <a:bodyPr wrap="none" lIns="0" tIns="0" rIns="0" bIns="0"/>
+          <a:lstStyle/>
           <a:p>
             <a:endParaRPr/>
           </a:p>
@@ -1507,11 +1689,14 @@
       </p:sp>
     </p:spTree>
   </p:cSld>
+  <p:clrMapOvr>
+    <a:masterClrMapping/>
+  </p:clrMapOvr>
 </p:sldLayout>
 </file>
 
 <file path=ppt/slideLayouts/slideLayout24.xml><?xml version="1.0" encoding="utf-8"?>
-<p:sldLayout xmlns:a="http://schemas.openxmlformats.org/drawingml/2006/main" xmlns:p="http://schemas.openxmlformats.org/presentationml/2006/main" xmlns:r="http://schemas.openxmlformats.org/officeDocument/2006/relationships" preserve="1" type="blank">
+<p:sldLayout xmlns:a="http://schemas.openxmlformats.org/drawingml/2006/main" xmlns:r="http://schemas.openxmlformats.org/officeDocument/2006/relationships" xmlns:p="http://schemas.openxmlformats.org/presentationml/2006/main" type="blank" preserve="1">
   <p:cSld name="Title, 6 Content">
     <p:spTree>
       <p:nvGrpSpPr>
@@ -1547,7 +1732,8 @@
           </a:prstGeom>
         </p:spPr>
         <p:txBody>
-          <a:bodyPr anchor="ctr" bIns="0" lIns="0" rIns="0" tIns="0" wrap="none"/>
+          <a:bodyPr wrap="none" lIns="0" tIns="0" rIns="0" bIns="0" anchor="ctr"/>
+          <a:lstStyle/>
           <a:p>
             <a:endParaRPr/>
           </a:p>
@@ -1573,7 +1759,8 @@
           </a:prstGeom>
         </p:spPr>
         <p:txBody>
-          <a:bodyPr bIns="0" lIns="0" rIns="0" tIns="0" wrap="none"/>
+          <a:bodyPr wrap="none" lIns="0" tIns="0" rIns="0" bIns="0"/>
+          <a:lstStyle/>
           <a:p>
             <a:endParaRPr/>
           </a:p>
@@ -1599,7 +1786,8 @@
           </a:prstGeom>
         </p:spPr>
         <p:txBody>
-          <a:bodyPr bIns="0" lIns="0" rIns="0" tIns="0" wrap="none"/>
+          <a:bodyPr wrap="none" lIns="0" tIns="0" rIns="0" bIns="0"/>
+          <a:lstStyle/>
           <a:p>
             <a:endParaRPr/>
           </a:p>
@@ -1607,7 +1795,7 @@
       </p:sp>
       <p:pic>
         <p:nvPicPr>
-          <p:cNvPr descr="" id="76" name=""/>
+          <p:cNvPr id="76" name="Picture 75"/>
           <p:cNvPicPr/>
           <p:nvPr/>
         </p:nvPicPr>
@@ -1632,12 +1820,12 @@
       </p:pic>
       <p:pic>
         <p:nvPicPr>
-          <p:cNvPr descr="" id="77" name=""/>
+          <p:cNvPr id="77" name="Picture 76"/>
           <p:cNvPicPr/>
           <p:nvPr/>
         </p:nvPicPr>
         <p:blipFill>
-          <a:blip r:embed="rId3"/>
+          <a:blip r:embed="rId2"/>
           <a:stretch>
             <a:fillRect/>
           </a:stretch>
@@ -1657,11 +1845,14 @@
       </p:pic>
     </p:spTree>
   </p:cSld>
+  <p:clrMapOvr>
+    <a:masterClrMapping/>
+  </p:clrMapOvr>
 </p:sldLayout>
 </file>
 
 <file path=ppt/slideLayouts/slideLayout3.xml><?xml version="1.0" encoding="utf-8"?>
-<p:sldLayout xmlns:a="http://schemas.openxmlformats.org/drawingml/2006/main" xmlns:p="http://schemas.openxmlformats.org/presentationml/2006/main" xmlns:r="http://schemas.openxmlformats.org/officeDocument/2006/relationships" preserve="1" type="obj">
+<p:sldLayout xmlns:a="http://schemas.openxmlformats.org/drawingml/2006/main" xmlns:r="http://schemas.openxmlformats.org/officeDocument/2006/relationships" xmlns:p="http://schemas.openxmlformats.org/presentationml/2006/main" type="obj" preserve="1">
   <p:cSld name="Title, Content">
     <p:spTree>
       <p:nvGrpSpPr>
@@ -1697,7 +1888,8 @@
           </a:prstGeom>
         </p:spPr>
         <p:txBody>
-          <a:bodyPr anchor="ctr" bIns="0" lIns="0" rIns="0" tIns="0" wrap="none"/>
+          <a:bodyPr wrap="none" lIns="0" tIns="0" rIns="0" bIns="0" anchor="ctr"/>
+          <a:lstStyle/>
           <a:p>
             <a:endParaRPr/>
           </a:p>
@@ -1723,7 +1915,8 @@
           </a:prstGeom>
         </p:spPr>
         <p:txBody>
-          <a:bodyPr bIns="0" lIns="0" rIns="0" tIns="0" wrap="none"/>
+          <a:bodyPr wrap="none" lIns="0" tIns="0" rIns="0" bIns="0"/>
+          <a:lstStyle/>
           <a:p>
             <a:endParaRPr/>
           </a:p>
@@ -1731,11 +1924,14 @@
       </p:sp>
     </p:spTree>
   </p:cSld>
+  <p:clrMapOvr>
+    <a:masterClrMapping/>
+  </p:clrMapOvr>
 </p:sldLayout>
 </file>
 
 <file path=ppt/slideLayouts/slideLayout4.xml><?xml version="1.0" encoding="utf-8"?>
-<p:sldLayout xmlns:a="http://schemas.openxmlformats.org/drawingml/2006/main" xmlns:p="http://schemas.openxmlformats.org/presentationml/2006/main" xmlns:r="http://schemas.openxmlformats.org/officeDocument/2006/relationships" preserve="1" type="twoObj">
+<p:sldLayout xmlns:a="http://schemas.openxmlformats.org/drawingml/2006/main" xmlns:r="http://schemas.openxmlformats.org/officeDocument/2006/relationships" xmlns:p="http://schemas.openxmlformats.org/presentationml/2006/main" type="twoObj" preserve="1">
   <p:cSld name="Title, 2 Content">
     <p:spTree>
       <p:nvGrpSpPr>
@@ -1771,7 +1967,8 @@
           </a:prstGeom>
         </p:spPr>
         <p:txBody>
-          <a:bodyPr anchor="ctr" bIns="0" lIns="0" rIns="0" tIns="0" wrap="none"/>
+          <a:bodyPr wrap="none" lIns="0" tIns="0" rIns="0" bIns="0" anchor="ctr"/>
+          <a:lstStyle/>
           <a:p>
             <a:endParaRPr/>
           </a:p>
@@ -1797,7 +1994,8 @@
           </a:prstGeom>
         </p:spPr>
         <p:txBody>
-          <a:bodyPr bIns="0" lIns="0" rIns="0" tIns="0" wrap="none"/>
+          <a:bodyPr wrap="none" lIns="0" tIns="0" rIns="0" bIns="0"/>
+          <a:lstStyle/>
           <a:p>
             <a:endParaRPr/>
           </a:p>
@@ -1823,7 +2021,8 @@
           </a:prstGeom>
         </p:spPr>
         <p:txBody>
-          <a:bodyPr bIns="0" lIns="0" rIns="0" tIns="0" wrap="none"/>
+          <a:bodyPr wrap="none" lIns="0" tIns="0" rIns="0" bIns="0"/>
+          <a:lstStyle/>
           <a:p>
             <a:endParaRPr/>
           </a:p>
@@ -1831,11 +2030,14 @@
       </p:sp>
     </p:spTree>
   </p:cSld>
+  <p:clrMapOvr>
+    <a:masterClrMapping/>
+  </p:clrMapOvr>
 </p:sldLayout>
 </file>
 
 <file path=ppt/slideLayouts/slideLayout5.xml><?xml version="1.0" encoding="utf-8"?>
-<p:sldLayout xmlns:a="http://schemas.openxmlformats.org/drawingml/2006/main" xmlns:p="http://schemas.openxmlformats.org/presentationml/2006/main" xmlns:r="http://schemas.openxmlformats.org/officeDocument/2006/relationships" preserve="1" type="titleOnly">
+<p:sldLayout xmlns:a="http://schemas.openxmlformats.org/drawingml/2006/main" xmlns:r="http://schemas.openxmlformats.org/officeDocument/2006/relationships" xmlns:p="http://schemas.openxmlformats.org/presentationml/2006/main" type="titleOnly" preserve="1">
   <p:cSld name="Title Only">
     <p:spTree>
       <p:nvGrpSpPr>
@@ -1871,7 +2073,8 @@
           </a:prstGeom>
         </p:spPr>
         <p:txBody>
-          <a:bodyPr anchor="ctr" bIns="0" lIns="0" rIns="0" tIns="0" wrap="none"/>
+          <a:bodyPr wrap="none" lIns="0" tIns="0" rIns="0" bIns="0" anchor="ctr"/>
+          <a:lstStyle/>
           <a:p>
             <a:endParaRPr/>
           </a:p>
@@ -1879,11 +2082,14 @@
       </p:sp>
     </p:spTree>
   </p:cSld>
+  <p:clrMapOvr>
+    <a:masterClrMapping/>
+  </p:clrMapOvr>
 </p:sldLayout>
 </file>
 
 <file path=ppt/slideLayouts/slideLayout6.xml><?xml version="1.0" encoding="utf-8"?>
-<p:sldLayout xmlns:a="http://schemas.openxmlformats.org/drawingml/2006/main" xmlns:p="http://schemas.openxmlformats.org/presentationml/2006/main" xmlns:r="http://schemas.openxmlformats.org/officeDocument/2006/relationships" preserve="1" type="objOnly">
+<p:sldLayout xmlns:a="http://schemas.openxmlformats.org/drawingml/2006/main" xmlns:r="http://schemas.openxmlformats.org/officeDocument/2006/relationships" xmlns:p="http://schemas.openxmlformats.org/presentationml/2006/main" type="objOnly" preserve="1">
   <p:cSld name="Centered Text">
     <p:spTree>
       <p:nvGrpSpPr>
@@ -1919,7 +2125,8 @@
           </a:prstGeom>
         </p:spPr>
         <p:txBody>
-          <a:bodyPr anchor="ctr" bIns="0" lIns="0" rIns="0" tIns="0" wrap="none"/>
+          <a:bodyPr wrap="none" lIns="0" tIns="0" rIns="0" bIns="0" anchor="ctr"/>
+          <a:lstStyle/>
           <a:p>
             <a:pPr algn="ctr"/>
             <a:endParaRPr/>
@@ -1928,11 +2135,14 @@
       </p:sp>
     </p:spTree>
   </p:cSld>
+  <p:clrMapOvr>
+    <a:masterClrMapping/>
+  </p:clrMapOvr>
 </p:sldLayout>
 </file>
 
 <file path=ppt/slideLayouts/slideLayout7.xml><?xml version="1.0" encoding="utf-8"?>
-<p:sldLayout xmlns:a="http://schemas.openxmlformats.org/drawingml/2006/main" xmlns:p="http://schemas.openxmlformats.org/presentationml/2006/main" xmlns:r="http://schemas.openxmlformats.org/officeDocument/2006/relationships" preserve="1" type="twoObjAndObj">
+<p:sldLayout xmlns:a="http://schemas.openxmlformats.org/drawingml/2006/main" xmlns:r="http://schemas.openxmlformats.org/officeDocument/2006/relationships" xmlns:p="http://schemas.openxmlformats.org/presentationml/2006/main" type="twoObjAndObj" preserve="1">
   <p:cSld name="Title, 2 Content and Content">
     <p:spTree>
       <p:nvGrpSpPr>
@@ -1968,7 +2178,8 @@
           </a:prstGeom>
         </p:spPr>
         <p:txBody>
-          <a:bodyPr anchor="ctr" bIns="0" lIns="0" rIns="0" tIns="0" wrap="none"/>
+          <a:bodyPr wrap="none" lIns="0" tIns="0" rIns="0" bIns="0" anchor="ctr"/>
+          <a:lstStyle/>
           <a:p>
             <a:endParaRPr/>
           </a:p>
@@ -1994,7 +2205,8 @@
           </a:prstGeom>
         </p:spPr>
         <p:txBody>
-          <a:bodyPr bIns="0" lIns="0" rIns="0" tIns="0" wrap="none"/>
+          <a:bodyPr wrap="none" lIns="0" tIns="0" rIns="0" bIns="0"/>
+          <a:lstStyle/>
           <a:p>
             <a:endParaRPr/>
           </a:p>
@@ -2020,7 +2232,8 @@
           </a:prstGeom>
         </p:spPr>
         <p:txBody>
-          <a:bodyPr bIns="0" lIns="0" rIns="0" tIns="0" wrap="none"/>
+          <a:bodyPr wrap="none" lIns="0" tIns="0" rIns="0" bIns="0"/>
+          <a:lstStyle/>
           <a:p>
             <a:endParaRPr/>
           </a:p>
@@ -2046,7 +2259,8 @@
           </a:prstGeom>
         </p:spPr>
         <p:txBody>
-          <a:bodyPr bIns="0" lIns="0" rIns="0" tIns="0" wrap="none"/>
+          <a:bodyPr wrap="none" lIns="0" tIns="0" rIns="0" bIns="0"/>
+          <a:lstStyle/>
           <a:p>
             <a:endParaRPr/>
           </a:p>
@@ -2054,11 +2268,14 @@
       </p:sp>
     </p:spTree>
   </p:cSld>
+  <p:clrMapOvr>
+    <a:masterClrMapping/>
+  </p:clrMapOvr>
 </p:sldLayout>
 </file>
 
 <file path=ppt/slideLayouts/slideLayout8.xml><?xml version="1.0" encoding="utf-8"?>
-<p:sldLayout xmlns:a="http://schemas.openxmlformats.org/drawingml/2006/main" xmlns:p="http://schemas.openxmlformats.org/presentationml/2006/main" xmlns:r="http://schemas.openxmlformats.org/officeDocument/2006/relationships" preserve="1" type="objAndTwoObj">
+<p:sldLayout xmlns:a="http://schemas.openxmlformats.org/drawingml/2006/main" xmlns:r="http://schemas.openxmlformats.org/officeDocument/2006/relationships" xmlns:p="http://schemas.openxmlformats.org/presentationml/2006/main" type="objAndTwoObj" preserve="1">
   <p:cSld name="Title Content and 2 Content">
     <p:spTree>
       <p:nvGrpSpPr>
@@ -2094,7 +2311,8 @@
           </a:prstGeom>
         </p:spPr>
         <p:txBody>
-          <a:bodyPr anchor="ctr" bIns="0" lIns="0" rIns="0" tIns="0" wrap="none"/>
+          <a:bodyPr wrap="none" lIns="0" tIns="0" rIns="0" bIns="0" anchor="ctr"/>
+          <a:lstStyle/>
           <a:p>
             <a:endParaRPr/>
           </a:p>
@@ -2120,7 +2338,8 @@
           </a:prstGeom>
         </p:spPr>
         <p:txBody>
-          <a:bodyPr bIns="0" lIns="0" rIns="0" tIns="0" wrap="none"/>
+          <a:bodyPr wrap="none" lIns="0" tIns="0" rIns="0" bIns="0"/>
+          <a:lstStyle/>
           <a:p>
             <a:endParaRPr/>
           </a:p>
@@ -2146,7 +2365,8 @@
           </a:prstGeom>
         </p:spPr>
         <p:txBody>
-          <a:bodyPr bIns="0" lIns="0" rIns="0" tIns="0" wrap="none"/>
+          <a:bodyPr wrap="none" lIns="0" tIns="0" rIns="0" bIns="0"/>
+          <a:lstStyle/>
           <a:p>
             <a:endParaRPr/>
           </a:p>
@@ -2172,7 +2392,8 @@
           </a:prstGeom>
         </p:spPr>
         <p:txBody>
-          <a:bodyPr bIns="0" lIns="0" rIns="0" tIns="0" wrap="none"/>
+          <a:bodyPr wrap="none" lIns="0" tIns="0" rIns="0" bIns="0"/>
+          <a:lstStyle/>
           <a:p>
             <a:endParaRPr/>
           </a:p>
@@ -2180,11 +2401,14 @@
       </p:sp>
     </p:spTree>
   </p:cSld>
+  <p:clrMapOvr>
+    <a:masterClrMapping/>
+  </p:clrMapOvr>
 </p:sldLayout>
 </file>
 
 <file path=ppt/slideLayouts/slideLayout9.xml><?xml version="1.0" encoding="utf-8"?>
-<p:sldLayout xmlns:a="http://schemas.openxmlformats.org/drawingml/2006/main" xmlns:p="http://schemas.openxmlformats.org/presentationml/2006/main" xmlns:r="http://schemas.openxmlformats.org/officeDocument/2006/relationships" preserve="1" type="twoObjOverTx">
+<p:sldLayout xmlns:a="http://schemas.openxmlformats.org/drawingml/2006/main" xmlns:r="http://schemas.openxmlformats.org/officeDocument/2006/relationships" xmlns:p="http://schemas.openxmlformats.org/presentationml/2006/main" type="twoObjOverTx" preserve="1">
   <p:cSld name="Title, 2 Content over Content">
     <p:spTree>
       <p:nvGrpSpPr>
@@ -2220,7 +2444,8 @@
           </a:prstGeom>
         </p:spPr>
         <p:txBody>
-          <a:bodyPr anchor="ctr" bIns="0" lIns="0" rIns="0" tIns="0" wrap="none"/>
+          <a:bodyPr wrap="none" lIns="0" tIns="0" rIns="0" bIns="0" anchor="ctr"/>
+          <a:lstStyle/>
           <a:p>
             <a:endParaRPr/>
           </a:p>
@@ -2246,7 +2471,8 @@
           </a:prstGeom>
         </p:spPr>
         <p:txBody>
-          <a:bodyPr bIns="0" lIns="0" rIns="0" tIns="0" wrap="none"/>
+          <a:bodyPr wrap="none" lIns="0" tIns="0" rIns="0" bIns="0"/>
+          <a:lstStyle/>
           <a:p>
             <a:endParaRPr/>
           </a:p>
@@ -2272,7 +2498,8 @@
           </a:prstGeom>
         </p:spPr>
         <p:txBody>
-          <a:bodyPr bIns="0" lIns="0" rIns="0" tIns="0" wrap="none"/>
+          <a:bodyPr wrap="none" lIns="0" tIns="0" rIns="0" bIns="0"/>
+          <a:lstStyle/>
           <a:p>
             <a:endParaRPr/>
           </a:p>
@@ -2298,7 +2525,8 @@
           </a:prstGeom>
         </p:spPr>
         <p:txBody>
-          <a:bodyPr bIns="0" lIns="0" rIns="0" tIns="0" wrap="none"/>
+          <a:bodyPr wrap="none" lIns="0" tIns="0" rIns="0" bIns="0"/>
+          <a:lstStyle/>
           <a:p>
             <a:endParaRPr/>
           </a:p>
@@ -2306,17 +2534,21 @@
       </p:sp>
     </p:spTree>
   </p:cSld>
+  <p:clrMapOvr>
+    <a:masterClrMapping/>
+  </p:clrMapOvr>
 </p:sldLayout>
 </file>
 
 <file path=ppt/slideMasters/slideMaster1.xml><?xml version="1.0" encoding="utf-8"?>
-<p:sldMaster xmlns:a="http://schemas.openxmlformats.org/drawingml/2006/main" xmlns:p="http://schemas.openxmlformats.org/presentationml/2006/main" xmlns:r="http://schemas.openxmlformats.org/officeDocument/2006/relationships">
+<p:sldMaster xmlns:a="http://schemas.openxmlformats.org/drawingml/2006/main" xmlns:r="http://schemas.openxmlformats.org/officeDocument/2006/relationships" xmlns:p="http://schemas.openxmlformats.org/presentationml/2006/main">
   <p:cSld>
     <p:bg>
       <p:bgPr>
         <a:solidFill>
-          <a:srgbClr val="ffffff"/>
+          <a:srgbClr val="FFFFFF"/>
         </a:solidFill>
+        <a:effectLst/>
       </p:bgPr>
     </p:bg>
     <p:spTree>
@@ -2335,7 +2567,7 @@
       </p:grpSpPr>
       <p:sp>
         <p:nvSpPr>
-          <p:cNvPr id="0" name="PlaceHolder 1"/>
+          <p:cNvPr id="5" name="PlaceHolder 1"/>
           <p:cNvSpPr>
             <a:spLocks noGrp="1"/>
           </p:cNvSpPr>
@@ -2354,6 +2586,7 @@
         </p:spPr>
         <p:txBody>
           <a:bodyPr anchor="b"/>
+          <a:lstStyle/>
           <a:p>
             <a:pPr algn="ctr">
               <a:lnSpc>
@@ -2375,7 +2608,7 @@
       </p:sp>
       <p:sp>
         <p:nvSpPr>
-          <p:cNvPr id="1" name="PlaceHolder 2"/>
+          <p:cNvPr id="6" name="PlaceHolder 2"/>
           <p:cNvSpPr>
             <a:spLocks noGrp="1"/>
           </p:cNvSpPr>
@@ -2394,6 +2627,7 @@
         </p:spPr>
         <p:txBody>
           <a:bodyPr anchor="ctr"/>
+          <a:lstStyle/>
           <a:p>
             <a:pPr>
               <a:lnSpc>
@@ -2403,7 +2637,7 @@
             <a:r>
               <a:rPr lang="en-US" sz="1729">
                 <a:solidFill>
-                  <a:srgbClr val="8b8b8b"/>
+                  <a:srgbClr val="8B8B8B"/>
                 </a:solidFill>
                 <a:latin typeface="Calibri"/>
               </a:rPr>
@@ -2434,6 +2668,7 @@
         </p:spPr>
         <p:txBody>
           <a:bodyPr anchor="ctr"/>
+          <a:lstStyle/>
           <a:p>
             <a:endParaRPr/>
           </a:p>
@@ -2460,6 +2695,7 @@
         </p:spPr>
         <p:txBody>
           <a:bodyPr anchor="ctr"/>
+          <a:lstStyle/>
           <a:p>
             <a:pPr algn="r">
               <a:lnSpc>
@@ -2469,11 +2705,11 @@
             <a:fld id="{20134E63-E96A-428D-8185-DC73B7ED1BFB}" type="slidenum">
               <a:rPr lang="en-US" sz="1729">
                 <a:solidFill>
-                  <a:srgbClr val="8b8b8b"/>
-                </a:solidFill>
-                <a:latin typeface="Calibri"/>
-              </a:rPr>
-              <a:t>&lt;number&gt;</a:t>
+                  <a:srgbClr val="8B8B8B"/>
+                </a:solidFill>
+                <a:latin typeface="Calibri"/>
+              </a:rPr>
+              <a:t>‹#›</a:t>
             </a:fld>
             <a:endParaRPr/>
           </a:p>
@@ -2499,7 +2735,8 @@
           </a:prstGeom>
         </p:spPr>
         <p:txBody>
-          <a:bodyPr bIns="0" lIns="0" rIns="0" tIns="0" wrap="none"/>
+          <a:bodyPr wrap="none" lIns="0" tIns="0" rIns="0" bIns="0"/>
+          <a:lstStyle/>
           <a:p>
             <a:pPr>
               <a:buSzPct val="25000"/>
@@ -2588,32 +2825,313 @@
       </p:sp>
     </p:spTree>
   </p:cSld>
-  <p:clrMap accent1="accent1" accent2="accent2" accent3="accent3" accent4="accent4" accent5="accent5" accent6="accent6" bg1="lt1" bg2="lt2" folHlink="folHlink" hlink="hlink" tx1="dk1" tx2="dk2"/>
+  <p:clrMap bg1="lt1" tx1="dk1" bg2="lt2" tx2="dk2" accent1="accent1" accent2="accent2" accent3="accent3" accent4="accent4" accent5="accent5" accent6="accent6" hlink="hlink" folHlink="folHlink"/>
   <p:sldLayoutIdLst>
-    <p:sldLayoutId id="2147483649" r:id="rId2"/>
-    <p:sldLayoutId id="2147483650" r:id="rId3"/>
-    <p:sldLayoutId id="2147483651" r:id="rId4"/>
-    <p:sldLayoutId id="2147483652" r:id="rId5"/>
-    <p:sldLayoutId id="2147483653" r:id="rId6"/>
-    <p:sldLayoutId id="2147483654" r:id="rId7"/>
-    <p:sldLayoutId id="2147483655" r:id="rId8"/>
-    <p:sldLayoutId id="2147483656" r:id="rId9"/>
-    <p:sldLayoutId id="2147483657" r:id="rId10"/>
-    <p:sldLayoutId id="2147483658" r:id="rId11"/>
-    <p:sldLayoutId id="2147483659" r:id="rId12"/>
-    <p:sldLayoutId id="2147483660" r:id="rId13"/>
+    <p:sldLayoutId id="2147483649" r:id="rId1"/>
+    <p:sldLayoutId id="2147483650" r:id="rId2"/>
+    <p:sldLayoutId id="2147483651" r:id="rId3"/>
+    <p:sldLayoutId id="2147483652" r:id="rId4"/>
+    <p:sldLayoutId id="2147483653" r:id="rId5"/>
+    <p:sldLayoutId id="2147483654" r:id="rId6"/>
+    <p:sldLayoutId id="2147483655" r:id="rId7"/>
+    <p:sldLayoutId id="2147483656" r:id="rId8"/>
+    <p:sldLayoutId id="2147483657" r:id="rId9"/>
+    <p:sldLayoutId id="2147483658" r:id="rId10"/>
+    <p:sldLayoutId id="2147483659" r:id="rId11"/>
+    <p:sldLayoutId id="2147483660" r:id="rId12"/>
   </p:sldLayoutIdLst>
+  <p:txStyles>
+    <p:titleStyle>
+      <a:lvl1pPr algn="l" defTabSz="914400" rtl="0" eaLnBrk="1" latinLnBrk="0" hangingPunct="1">
+        <a:lnSpc>
+          <a:spcPct val="90000"/>
+        </a:lnSpc>
+        <a:spcBef>
+          <a:spcPct val="0"/>
+        </a:spcBef>
+        <a:buNone/>
+        <a:defRPr sz="4400" kern="1200">
+          <a:solidFill>
+            <a:schemeClr val="tx1"/>
+          </a:solidFill>
+          <a:latin typeface="+mj-lt"/>
+          <a:ea typeface="+mj-ea"/>
+          <a:cs typeface="+mj-cs"/>
+        </a:defRPr>
+      </a:lvl1pPr>
+    </p:titleStyle>
+    <p:bodyStyle>
+      <a:lvl1pPr marL="228600" indent="-228600" algn="l" defTabSz="914400" rtl="0" eaLnBrk="1" latinLnBrk="0" hangingPunct="1">
+        <a:lnSpc>
+          <a:spcPct val="90000"/>
+        </a:lnSpc>
+        <a:spcBef>
+          <a:spcPts val="1000"/>
+        </a:spcBef>
+        <a:buFont typeface="Arial" panose="020B0604020202020204" pitchFamily="34" charset="0"/>
+        <a:buChar char="•"/>
+        <a:defRPr sz="2800" kern="1200">
+          <a:solidFill>
+            <a:schemeClr val="tx1"/>
+          </a:solidFill>
+          <a:latin typeface="+mn-lt"/>
+          <a:ea typeface="+mn-ea"/>
+          <a:cs typeface="+mn-cs"/>
+        </a:defRPr>
+      </a:lvl1pPr>
+      <a:lvl2pPr marL="685800" indent="-228600" algn="l" defTabSz="914400" rtl="0" eaLnBrk="1" latinLnBrk="0" hangingPunct="1">
+        <a:lnSpc>
+          <a:spcPct val="90000"/>
+        </a:lnSpc>
+        <a:spcBef>
+          <a:spcPts val="500"/>
+        </a:spcBef>
+        <a:buFont typeface="Arial" panose="020B0604020202020204" pitchFamily="34" charset="0"/>
+        <a:buChar char="•"/>
+        <a:defRPr sz="2400" kern="1200">
+          <a:solidFill>
+            <a:schemeClr val="tx1"/>
+          </a:solidFill>
+          <a:latin typeface="+mn-lt"/>
+          <a:ea typeface="+mn-ea"/>
+          <a:cs typeface="+mn-cs"/>
+        </a:defRPr>
+      </a:lvl2pPr>
+      <a:lvl3pPr marL="1143000" indent="-228600" algn="l" defTabSz="914400" rtl="0" eaLnBrk="1" latinLnBrk="0" hangingPunct="1">
+        <a:lnSpc>
+          <a:spcPct val="90000"/>
+        </a:lnSpc>
+        <a:spcBef>
+          <a:spcPts val="500"/>
+        </a:spcBef>
+        <a:buFont typeface="Arial" panose="020B0604020202020204" pitchFamily="34" charset="0"/>
+        <a:buChar char="•"/>
+        <a:defRPr sz="2000" kern="1200">
+          <a:solidFill>
+            <a:schemeClr val="tx1"/>
+          </a:solidFill>
+          <a:latin typeface="+mn-lt"/>
+          <a:ea typeface="+mn-ea"/>
+          <a:cs typeface="+mn-cs"/>
+        </a:defRPr>
+      </a:lvl3pPr>
+      <a:lvl4pPr marL="1600200" indent="-228600" algn="l" defTabSz="914400" rtl="0" eaLnBrk="1" latinLnBrk="0" hangingPunct="1">
+        <a:lnSpc>
+          <a:spcPct val="90000"/>
+        </a:lnSpc>
+        <a:spcBef>
+          <a:spcPts val="500"/>
+        </a:spcBef>
+        <a:buFont typeface="Arial" panose="020B0604020202020204" pitchFamily="34" charset="0"/>
+        <a:buChar char="•"/>
+        <a:defRPr sz="1800" kern="1200">
+          <a:solidFill>
+            <a:schemeClr val="tx1"/>
+          </a:solidFill>
+          <a:latin typeface="+mn-lt"/>
+          <a:ea typeface="+mn-ea"/>
+          <a:cs typeface="+mn-cs"/>
+        </a:defRPr>
+      </a:lvl4pPr>
+      <a:lvl5pPr marL="2057400" indent="-228600" algn="l" defTabSz="914400" rtl="0" eaLnBrk="1" latinLnBrk="0" hangingPunct="1">
+        <a:lnSpc>
+          <a:spcPct val="90000"/>
+        </a:lnSpc>
+        <a:spcBef>
+          <a:spcPts val="500"/>
+        </a:spcBef>
+        <a:buFont typeface="Arial" panose="020B0604020202020204" pitchFamily="34" charset="0"/>
+        <a:buChar char="•"/>
+        <a:defRPr sz="1800" kern="1200">
+          <a:solidFill>
+            <a:schemeClr val="tx1"/>
+          </a:solidFill>
+          <a:latin typeface="+mn-lt"/>
+          <a:ea typeface="+mn-ea"/>
+          <a:cs typeface="+mn-cs"/>
+        </a:defRPr>
+      </a:lvl5pPr>
+      <a:lvl6pPr marL="2514600" indent="-228600" algn="l" defTabSz="914400" rtl="0" eaLnBrk="1" latinLnBrk="0" hangingPunct="1">
+        <a:lnSpc>
+          <a:spcPct val="90000"/>
+        </a:lnSpc>
+        <a:spcBef>
+          <a:spcPts val="500"/>
+        </a:spcBef>
+        <a:buFont typeface="Arial" panose="020B0604020202020204" pitchFamily="34" charset="0"/>
+        <a:buChar char="•"/>
+        <a:defRPr sz="1800" kern="1200">
+          <a:solidFill>
+            <a:schemeClr val="tx1"/>
+          </a:solidFill>
+          <a:latin typeface="+mn-lt"/>
+          <a:ea typeface="+mn-ea"/>
+          <a:cs typeface="+mn-cs"/>
+        </a:defRPr>
+      </a:lvl6pPr>
+      <a:lvl7pPr marL="2971800" indent="-228600" algn="l" defTabSz="914400" rtl="0" eaLnBrk="1" latinLnBrk="0" hangingPunct="1">
+        <a:lnSpc>
+          <a:spcPct val="90000"/>
+        </a:lnSpc>
+        <a:spcBef>
+          <a:spcPts val="500"/>
+        </a:spcBef>
+        <a:buFont typeface="Arial" panose="020B0604020202020204" pitchFamily="34" charset="0"/>
+        <a:buChar char="•"/>
+        <a:defRPr sz="1800" kern="1200">
+          <a:solidFill>
+            <a:schemeClr val="tx1"/>
+          </a:solidFill>
+          <a:latin typeface="+mn-lt"/>
+          <a:ea typeface="+mn-ea"/>
+          <a:cs typeface="+mn-cs"/>
+        </a:defRPr>
+      </a:lvl7pPr>
+      <a:lvl8pPr marL="3429000" indent="-228600" algn="l" defTabSz="914400" rtl="0" eaLnBrk="1" latinLnBrk="0" hangingPunct="1">
+        <a:lnSpc>
+          <a:spcPct val="90000"/>
+        </a:lnSpc>
+        <a:spcBef>
+          <a:spcPts val="500"/>
+        </a:spcBef>
+        <a:buFont typeface="Arial" panose="020B0604020202020204" pitchFamily="34" charset="0"/>
+        <a:buChar char="•"/>
+        <a:defRPr sz="1800" kern="1200">
+          <a:solidFill>
+            <a:schemeClr val="tx1"/>
+          </a:solidFill>
+          <a:latin typeface="+mn-lt"/>
+          <a:ea typeface="+mn-ea"/>
+          <a:cs typeface="+mn-cs"/>
+        </a:defRPr>
+      </a:lvl8pPr>
+      <a:lvl9pPr marL="3886200" indent="-228600" algn="l" defTabSz="914400" rtl="0" eaLnBrk="1" latinLnBrk="0" hangingPunct="1">
+        <a:lnSpc>
+          <a:spcPct val="90000"/>
+        </a:lnSpc>
+        <a:spcBef>
+          <a:spcPts val="500"/>
+        </a:spcBef>
+        <a:buFont typeface="Arial" panose="020B0604020202020204" pitchFamily="34" charset="0"/>
+        <a:buChar char="•"/>
+        <a:defRPr sz="1800" kern="1200">
+          <a:solidFill>
+            <a:schemeClr val="tx1"/>
+          </a:solidFill>
+          <a:latin typeface="+mn-lt"/>
+          <a:ea typeface="+mn-ea"/>
+          <a:cs typeface="+mn-cs"/>
+        </a:defRPr>
+      </a:lvl9pPr>
+    </p:bodyStyle>
+    <p:otherStyle>
+      <a:defPPr>
+        <a:defRPr lang="en-US"/>
+      </a:defPPr>
+      <a:lvl1pPr marL="0" algn="l" defTabSz="914400" rtl="0" eaLnBrk="1" latinLnBrk="0" hangingPunct="1">
+        <a:defRPr sz="1800" kern="1200">
+          <a:solidFill>
+            <a:schemeClr val="tx1"/>
+          </a:solidFill>
+          <a:latin typeface="+mn-lt"/>
+          <a:ea typeface="+mn-ea"/>
+          <a:cs typeface="+mn-cs"/>
+        </a:defRPr>
+      </a:lvl1pPr>
+      <a:lvl2pPr marL="457200" algn="l" defTabSz="914400" rtl="0" eaLnBrk="1" latinLnBrk="0" hangingPunct="1">
+        <a:defRPr sz="1800" kern="1200">
+          <a:solidFill>
+            <a:schemeClr val="tx1"/>
+          </a:solidFill>
+          <a:latin typeface="+mn-lt"/>
+          <a:ea typeface="+mn-ea"/>
+          <a:cs typeface="+mn-cs"/>
+        </a:defRPr>
+      </a:lvl2pPr>
+      <a:lvl3pPr marL="914400" algn="l" defTabSz="914400" rtl="0" eaLnBrk="1" latinLnBrk="0" hangingPunct="1">
+        <a:defRPr sz="1800" kern="1200">
+          <a:solidFill>
+            <a:schemeClr val="tx1"/>
+          </a:solidFill>
+          <a:latin typeface="+mn-lt"/>
+          <a:ea typeface="+mn-ea"/>
+          <a:cs typeface="+mn-cs"/>
+        </a:defRPr>
+      </a:lvl3pPr>
+      <a:lvl4pPr marL="1371600" algn="l" defTabSz="914400" rtl="0" eaLnBrk="1" latinLnBrk="0" hangingPunct="1">
+        <a:defRPr sz="1800" kern="1200">
+          <a:solidFill>
+            <a:schemeClr val="tx1"/>
+          </a:solidFill>
+          <a:latin typeface="+mn-lt"/>
+          <a:ea typeface="+mn-ea"/>
+          <a:cs typeface="+mn-cs"/>
+        </a:defRPr>
+      </a:lvl4pPr>
+      <a:lvl5pPr marL="1828800" algn="l" defTabSz="914400" rtl="0" eaLnBrk="1" latinLnBrk="0" hangingPunct="1">
+        <a:defRPr sz="1800" kern="1200">
+          <a:solidFill>
+            <a:schemeClr val="tx1"/>
+          </a:solidFill>
+          <a:latin typeface="+mn-lt"/>
+          <a:ea typeface="+mn-ea"/>
+          <a:cs typeface="+mn-cs"/>
+        </a:defRPr>
+      </a:lvl5pPr>
+      <a:lvl6pPr marL="2286000" algn="l" defTabSz="914400" rtl="0" eaLnBrk="1" latinLnBrk="0" hangingPunct="1">
+        <a:defRPr sz="1800" kern="1200">
+          <a:solidFill>
+            <a:schemeClr val="tx1"/>
+          </a:solidFill>
+          <a:latin typeface="+mn-lt"/>
+          <a:ea typeface="+mn-ea"/>
+          <a:cs typeface="+mn-cs"/>
+        </a:defRPr>
+      </a:lvl6pPr>
+      <a:lvl7pPr marL="2743200" algn="l" defTabSz="914400" rtl="0" eaLnBrk="1" latinLnBrk="0" hangingPunct="1">
+        <a:defRPr sz="1800" kern="1200">
+          <a:solidFill>
+            <a:schemeClr val="tx1"/>
+          </a:solidFill>
+          <a:latin typeface="+mn-lt"/>
+          <a:ea typeface="+mn-ea"/>
+          <a:cs typeface="+mn-cs"/>
+        </a:defRPr>
+      </a:lvl7pPr>
+      <a:lvl8pPr marL="3200400" algn="l" defTabSz="914400" rtl="0" eaLnBrk="1" latinLnBrk="0" hangingPunct="1">
+        <a:defRPr sz="1800" kern="1200">
+          <a:solidFill>
+            <a:schemeClr val="tx1"/>
+          </a:solidFill>
+          <a:latin typeface="+mn-lt"/>
+          <a:ea typeface="+mn-ea"/>
+          <a:cs typeface="+mn-cs"/>
+        </a:defRPr>
+      </a:lvl8pPr>
+      <a:lvl9pPr marL="3657600" algn="l" defTabSz="914400" rtl="0" eaLnBrk="1" latinLnBrk="0" hangingPunct="1">
+        <a:defRPr sz="1800" kern="1200">
+          <a:solidFill>
+            <a:schemeClr val="tx1"/>
+          </a:solidFill>
+          <a:latin typeface="+mn-lt"/>
+          <a:ea typeface="+mn-ea"/>
+          <a:cs typeface="+mn-cs"/>
+        </a:defRPr>
+      </a:lvl9pPr>
+    </p:otherStyle>
+  </p:txStyles>
 </p:sldMaster>
 </file>
 
 <file path=ppt/slideMasters/slideMaster2.xml><?xml version="1.0" encoding="utf-8"?>
-<p:sldMaster xmlns:a="http://schemas.openxmlformats.org/drawingml/2006/main" xmlns:p="http://schemas.openxmlformats.org/presentationml/2006/main" xmlns:r="http://schemas.openxmlformats.org/officeDocument/2006/relationships">
+<p:sldMaster xmlns:a="http://schemas.openxmlformats.org/drawingml/2006/main" xmlns:r="http://schemas.openxmlformats.org/officeDocument/2006/relationships" xmlns:p="http://schemas.openxmlformats.org/presentationml/2006/main">
   <p:cSld>
     <p:bg>
       <p:bgPr>
         <a:solidFill>
-          <a:srgbClr val="ffffff"/>
+          <a:srgbClr val="FFFFFF"/>
         </a:solidFill>
+        <a:effectLst/>
       </p:bgPr>
     </p:bg>
     <p:spTree>
@@ -2651,6 +3169,7 @@
         </p:spPr>
         <p:txBody>
           <a:bodyPr anchor="ctr"/>
+          <a:lstStyle/>
           <a:p>
             <a:pPr>
               <a:lnSpc>
@@ -2691,6 +3210,7 @@
         </p:spPr>
         <p:txBody>
           <a:bodyPr/>
+          <a:lstStyle/>
           <a:p>
             <a:pPr>
               <a:buSzPct val="25000"/>
@@ -2911,6 +3431,7 @@
         </p:spPr>
         <p:txBody>
           <a:bodyPr anchor="ctr"/>
+          <a:lstStyle/>
           <a:p>
             <a:pPr>
               <a:lnSpc>
@@ -2920,7 +3441,7 @@
             <a:r>
               <a:rPr lang="en-US" sz="1729">
                 <a:solidFill>
-                  <a:srgbClr val="8b8b8b"/>
+                  <a:srgbClr val="8B8B8B"/>
                 </a:solidFill>
                 <a:latin typeface="Calibri"/>
               </a:rPr>
@@ -2951,6 +3472,7 @@
         </p:spPr>
         <p:txBody>
           <a:bodyPr anchor="ctr"/>
+          <a:lstStyle/>
           <a:p>
             <a:endParaRPr/>
           </a:p>
@@ -2977,6 +3499,7 @@
         </p:spPr>
         <p:txBody>
           <a:bodyPr anchor="ctr"/>
+          <a:lstStyle/>
           <a:p>
             <a:pPr algn="r">
               <a:lnSpc>
@@ -2986,11 +3509,11 @@
             <a:fld id="{9F1F8938-68E4-48D7-9EE3-FE30C7D91016}" type="slidenum">
               <a:rPr lang="en-US" sz="1729">
                 <a:solidFill>
-                  <a:srgbClr val="8b8b8b"/>
-                </a:solidFill>
-                <a:latin typeface="Calibri"/>
-              </a:rPr>
-              <a:t>&lt;number&gt;</a:t>
+                  <a:srgbClr val="8B8B8B"/>
+                </a:solidFill>
+                <a:latin typeface="Calibri"/>
+              </a:rPr>
+              <a:t>‹#›</a:t>
             </a:fld>
             <a:endParaRPr/>
           </a:p>
@@ -2998,32 +3521,313 @@
       </p:sp>
     </p:spTree>
   </p:cSld>
-  <p:clrMap accent1="accent1" accent2="accent2" accent3="accent3" accent4="accent4" accent5="accent5" accent6="accent6" bg1="lt1" bg2="lt2" folHlink="folHlink" hlink="hlink" tx1="dk1" tx2="dk2"/>
+  <p:clrMap bg1="lt1" tx1="dk1" bg2="lt2" tx2="dk2" accent1="accent1" accent2="accent2" accent3="accent3" accent4="accent4" accent5="accent5" accent6="accent6" hlink="hlink" folHlink="folHlink"/>
   <p:sldLayoutIdLst>
-    <p:sldLayoutId id="2147483662" r:id="rId2"/>
-    <p:sldLayoutId id="2147483663" r:id="rId3"/>
-    <p:sldLayoutId id="2147483664" r:id="rId4"/>
-    <p:sldLayoutId id="2147483665" r:id="rId5"/>
-    <p:sldLayoutId id="2147483666" r:id="rId6"/>
-    <p:sldLayoutId id="2147483667" r:id="rId7"/>
-    <p:sldLayoutId id="2147483668" r:id="rId8"/>
-    <p:sldLayoutId id="2147483669" r:id="rId9"/>
-    <p:sldLayoutId id="2147483670" r:id="rId10"/>
-    <p:sldLayoutId id="2147483671" r:id="rId11"/>
-    <p:sldLayoutId id="2147483672" r:id="rId12"/>
-    <p:sldLayoutId id="2147483673" r:id="rId13"/>
+    <p:sldLayoutId id="2147483662" r:id="rId1"/>
+    <p:sldLayoutId id="2147483663" r:id="rId2"/>
+    <p:sldLayoutId id="2147483664" r:id="rId3"/>
+    <p:sldLayoutId id="2147483665" r:id="rId4"/>
+    <p:sldLayoutId id="2147483666" r:id="rId5"/>
+    <p:sldLayoutId id="2147483667" r:id="rId6"/>
+    <p:sldLayoutId id="2147483668" r:id="rId7"/>
+    <p:sldLayoutId id="2147483669" r:id="rId8"/>
+    <p:sldLayoutId id="2147483670" r:id="rId9"/>
+    <p:sldLayoutId id="2147483671" r:id="rId10"/>
+    <p:sldLayoutId id="2147483672" r:id="rId11"/>
+    <p:sldLayoutId id="2147483673" r:id="rId12"/>
   </p:sldLayoutIdLst>
+  <p:txStyles>
+    <p:titleStyle>
+      <a:lvl1pPr algn="l" defTabSz="914400" rtl="0" eaLnBrk="1" latinLnBrk="0" hangingPunct="1">
+        <a:lnSpc>
+          <a:spcPct val="90000"/>
+        </a:lnSpc>
+        <a:spcBef>
+          <a:spcPct val="0"/>
+        </a:spcBef>
+        <a:buNone/>
+        <a:defRPr sz="4400" kern="1200">
+          <a:solidFill>
+            <a:schemeClr val="tx1"/>
+          </a:solidFill>
+          <a:latin typeface="+mj-lt"/>
+          <a:ea typeface="+mj-ea"/>
+          <a:cs typeface="+mj-cs"/>
+        </a:defRPr>
+      </a:lvl1pPr>
+    </p:titleStyle>
+    <p:bodyStyle>
+      <a:lvl1pPr marL="228600" indent="-228600" algn="l" defTabSz="914400" rtl="0" eaLnBrk="1" latinLnBrk="0" hangingPunct="1">
+        <a:lnSpc>
+          <a:spcPct val="90000"/>
+        </a:lnSpc>
+        <a:spcBef>
+          <a:spcPts val="1000"/>
+        </a:spcBef>
+        <a:buFont typeface="Arial" panose="020B0604020202020204" pitchFamily="34" charset="0"/>
+        <a:buChar char="•"/>
+        <a:defRPr sz="2800" kern="1200">
+          <a:solidFill>
+            <a:schemeClr val="tx1"/>
+          </a:solidFill>
+          <a:latin typeface="+mn-lt"/>
+          <a:ea typeface="+mn-ea"/>
+          <a:cs typeface="+mn-cs"/>
+        </a:defRPr>
+      </a:lvl1pPr>
+      <a:lvl2pPr marL="685800" indent="-228600" algn="l" defTabSz="914400" rtl="0" eaLnBrk="1" latinLnBrk="0" hangingPunct="1">
+        <a:lnSpc>
+          <a:spcPct val="90000"/>
+        </a:lnSpc>
+        <a:spcBef>
+          <a:spcPts val="500"/>
+        </a:spcBef>
+        <a:buFont typeface="Arial" panose="020B0604020202020204" pitchFamily="34" charset="0"/>
+        <a:buChar char="•"/>
+        <a:defRPr sz="2400" kern="1200">
+          <a:solidFill>
+            <a:schemeClr val="tx1"/>
+          </a:solidFill>
+          <a:latin typeface="+mn-lt"/>
+          <a:ea typeface="+mn-ea"/>
+          <a:cs typeface="+mn-cs"/>
+        </a:defRPr>
+      </a:lvl2pPr>
+      <a:lvl3pPr marL="1143000" indent="-228600" algn="l" defTabSz="914400" rtl="0" eaLnBrk="1" latinLnBrk="0" hangingPunct="1">
+        <a:lnSpc>
+          <a:spcPct val="90000"/>
+        </a:lnSpc>
+        <a:spcBef>
+          <a:spcPts val="500"/>
+        </a:spcBef>
+        <a:buFont typeface="Arial" panose="020B0604020202020204" pitchFamily="34" charset="0"/>
+        <a:buChar char="•"/>
+        <a:defRPr sz="2000" kern="1200">
+          <a:solidFill>
+            <a:schemeClr val="tx1"/>
+          </a:solidFill>
+          <a:latin typeface="+mn-lt"/>
+          <a:ea typeface="+mn-ea"/>
+          <a:cs typeface="+mn-cs"/>
+        </a:defRPr>
+      </a:lvl3pPr>
+      <a:lvl4pPr marL="1600200" indent="-228600" algn="l" defTabSz="914400" rtl="0" eaLnBrk="1" latinLnBrk="0" hangingPunct="1">
+        <a:lnSpc>
+          <a:spcPct val="90000"/>
+        </a:lnSpc>
+        <a:spcBef>
+          <a:spcPts val="500"/>
+        </a:spcBef>
+        <a:buFont typeface="Arial" panose="020B0604020202020204" pitchFamily="34" charset="0"/>
+        <a:buChar char="•"/>
+        <a:defRPr sz="1800" kern="1200">
+          <a:solidFill>
+            <a:schemeClr val="tx1"/>
+          </a:solidFill>
+          <a:latin typeface="+mn-lt"/>
+          <a:ea typeface="+mn-ea"/>
+          <a:cs typeface="+mn-cs"/>
+        </a:defRPr>
+      </a:lvl4pPr>
+      <a:lvl5pPr marL="2057400" indent="-228600" algn="l" defTabSz="914400" rtl="0" eaLnBrk="1" latinLnBrk="0" hangingPunct="1">
+        <a:lnSpc>
+          <a:spcPct val="90000"/>
+        </a:lnSpc>
+        <a:spcBef>
+          <a:spcPts val="500"/>
+        </a:spcBef>
+        <a:buFont typeface="Arial" panose="020B0604020202020204" pitchFamily="34" charset="0"/>
+        <a:buChar char="•"/>
+        <a:defRPr sz="1800" kern="1200">
+          <a:solidFill>
+            <a:schemeClr val="tx1"/>
+          </a:solidFill>
+          <a:latin typeface="+mn-lt"/>
+          <a:ea typeface="+mn-ea"/>
+          <a:cs typeface="+mn-cs"/>
+        </a:defRPr>
+      </a:lvl5pPr>
+      <a:lvl6pPr marL="2514600" indent="-228600" algn="l" defTabSz="914400" rtl="0" eaLnBrk="1" latinLnBrk="0" hangingPunct="1">
+        <a:lnSpc>
+          <a:spcPct val="90000"/>
+        </a:lnSpc>
+        <a:spcBef>
+          <a:spcPts val="500"/>
+        </a:spcBef>
+        <a:buFont typeface="Arial" panose="020B0604020202020204" pitchFamily="34" charset="0"/>
+        <a:buChar char="•"/>
+        <a:defRPr sz="1800" kern="1200">
+          <a:solidFill>
+            <a:schemeClr val="tx1"/>
+          </a:solidFill>
+          <a:latin typeface="+mn-lt"/>
+          <a:ea typeface="+mn-ea"/>
+          <a:cs typeface="+mn-cs"/>
+        </a:defRPr>
+      </a:lvl6pPr>
+      <a:lvl7pPr marL="2971800" indent="-228600" algn="l" defTabSz="914400" rtl="0" eaLnBrk="1" latinLnBrk="0" hangingPunct="1">
+        <a:lnSpc>
+          <a:spcPct val="90000"/>
+        </a:lnSpc>
+        <a:spcBef>
+          <a:spcPts val="500"/>
+        </a:spcBef>
+        <a:buFont typeface="Arial" panose="020B0604020202020204" pitchFamily="34" charset="0"/>
+        <a:buChar char="•"/>
+        <a:defRPr sz="1800" kern="1200">
+          <a:solidFill>
+            <a:schemeClr val="tx1"/>
+          </a:solidFill>
+          <a:latin typeface="+mn-lt"/>
+          <a:ea typeface="+mn-ea"/>
+          <a:cs typeface="+mn-cs"/>
+        </a:defRPr>
+      </a:lvl7pPr>
+      <a:lvl8pPr marL="3429000" indent="-228600" algn="l" defTabSz="914400" rtl="0" eaLnBrk="1" latinLnBrk="0" hangingPunct="1">
+        <a:lnSpc>
+          <a:spcPct val="90000"/>
+        </a:lnSpc>
+        <a:spcBef>
+          <a:spcPts val="500"/>
+        </a:spcBef>
+        <a:buFont typeface="Arial" panose="020B0604020202020204" pitchFamily="34" charset="0"/>
+        <a:buChar char="•"/>
+        <a:defRPr sz="1800" kern="1200">
+          <a:solidFill>
+            <a:schemeClr val="tx1"/>
+          </a:solidFill>
+          <a:latin typeface="+mn-lt"/>
+          <a:ea typeface="+mn-ea"/>
+          <a:cs typeface="+mn-cs"/>
+        </a:defRPr>
+      </a:lvl8pPr>
+      <a:lvl9pPr marL="3886200" indent="-228600" algn="l" defTabSz="914400" rtl="0" eaLnBrk="1" latinLnBrk="0" hangingPunct="1">
+        <a:lnSpc>
+          <a:spcPct val="90000"/>
+        </a:lnSpc>
+        <a:spcBef>
+          <a:spcPts val="500"/>
+        </a:spcBef>
+        <a:buFont typeface="Arial" panose="020B0604020202020204" pitchFamily="34" charset="0"/>
+        <a:buChar char="•"/>
+        <a:defRPr sz="1800" kern="1200">
+          <a:solidFill>
+            <a:schemeClr val="tx1"/>
+          </a:solidFill>
+          <a:latin typeface="+mn-lt"/>
+          <a:ea typeface="+mn-ea"/>
+          <a:cs typeface="+mn-cs"/>
+        </a:defRPr>
+      </a:lvl9pPr>
+    </p:bodyStyle>
+    <p:otherStyle>
+      <a:defPPr>
+        <a:defRPr lang="en-US"/>
+      </a:defPPr>
+      <a:lvl1pPr marL="0" algn="l" defTabSz="914400" rtl="0" eaLnBrk="1" latinLnBrk="0" hangingPunct="1">
+        <a:defRPr sz="1800" kern="1200">
+          <a:solidFill>
+            <a:schemeClr val="tx1"/>
+          </a:solidFill>
+          <a:latin typeface="+mn-lt"/>
+          <a:ea typeface="+mn-ea"/>
+          <a:cs typeface="+mn-cs"/>
+        </a:defRPr>
+      </a:lvl1pPr>
+      <a:lvl2pPr marL="457200" algn="l" defTabSz="914400" rtl="0" eaLnBrk="1" latinLnBrk="0" hangingPunct="1">
+        <a:defRPr sz="1800" kern="1200">
+          <a:solidFill>
+            <a:schemeClr val="tx1"/>
+          </a:solidFill>
+          <a:latin typeface="+mn-lt"/>
+          <a:ea typeface="+mn-ea"/>
+          <a:cs typeface="+mn-cs"/>
+        </a:defRPr>
+      </a:lvl2pPr>
+      <a:lvl3pPr marL="914400" algn="l" defTabSz="914400" rtl="0" eaLnBrk="1" latinLnBrk="0" hangingPunct="1">
+        <a:defRPr sz="1800" kern="1200">
+          <a:solidFill>
+            <a:schemeClr val="tx1"/>
+          </a:solidFill>
+          <a:latin typeface="+mn-lt"/>
+          <a:ea typeface="+mn-ea"/>
+          <a:cs typeface="+mn-cs"/>
+        </a:defRPr>
+      </a:lvl3pPr>
+      <a:lvl4pPr marL="1371600" algn="l" defTabSz="914400" rtl="0" eaLnBrk="1" latinLnBrk="0" hangingPunct="1">
+        <a:defRPr sz="1800" kern="1200">
+          <a:solidFill>
+            <a:schemeClr val="tx1"/>
+          </a:solidFill>
+          <a:latin typeface="+mn-lt"/>
+          <a:ea typeface="+mn-ea"/>
+          <a:cs typeface="+mn-cs"/>
+        </a:defRPr>
+      </a:lvl4pPr>
+      <a:lvl5pPr marL="1828800" algn="l" defTabSz="914400" rtl="0" eaLnBrk="1" latinLnBrk="0" hangingPunct="1">
+        <a:defRPr sz="1800" kern="1200">
+          <a:solidFill>
+            <a:schemeClr val="tx1"/>
+          </a:solidFill>
+          <a:latin typeface="+mn-lt"/>
+          <a:ea typeface="+mn-ea"/>
+          <a:cs typeface="+mn-cs"/>
+        </a:defRPr>
+      </a:lvl5pPr>
+      <a:lvl6pPr marL="2286000" algn="l" defTabSz="914400" rtl="0" eaLnBrk="1" latinLnBrk="0" hangingPunct="1">
+        <a:defRPr sz="1800" kern="1200">
+          <a:solidFill>
+            <a:schemeClr val="tx1"/>
+          </a:solidFill>
+          <a:latin typeface="+mn-lt"/>
+          <a:ea typeface="+mn-ea"/>
+          <a:cs typeface="+mn-cs"/>
+        </a:defRPr>
+      </a:lvl6pPr>
+      <a:lvl7pPr marL="2743200" algn="l" defTabSz="914400" rtl="0" eaLnBrk="1" latinLnBrk="0" hangingPunct="1">
+        <a:defRPr sz="1800" kern="1200">
+          <a:solidFill>
+            <a:schemeClr val="tx1"/>
+          </a:solidFill>
+          <a:latin typeface="+mn-lt"/>
+          <a:ea typeface="+mn-ea"/>
+          <a:cs typeface="+mn-cs"/>
+        </a:defRPr>
+      </a:lvl7pPr>
+      <a:lvl8pPr marL="3200400" algn="l" defTabSz="914400" rtl="0" eaLnBrk="1" latinLnBrk="0" hangingPunct="1">
+        <a:defRPr sz="1800" kern="1200">
+          <a:solidFill>
+            <a:schemeClr val="tx1"/>
+          </a:solidFill>
+          <a:latin typeface="+mn-lt"/>
+          <a:ea typeface="+mn-ea"/>
+          <a:cs typeface="+mn-cs"/>
+        </a:defRPr>
+      </a:lvl8pPr>
+      <a:lvl9pPr marL="3657600" algn="l" defTabSz="914400" rtl="0" eaLnBrk="1" latinLnBrk="0" hangingPunct="1">
+        <a:defRPr sz="1800" kern="1200">
+          <a:solidFill>
+            <a:schemeClr val="tx1"/>
+          </a:solidFill>
+          <a:latin typeface="+mn-lt"/>
+          <a:ea typeface="+mn-ea"/>
+          <a:cs typeface="+mn-cs"/>
+        </a:defRPr>
+      </a:lvl9pPr>
+    </p:otherStyle>
+  </p:txStyles>
 </p:sldMaster>
 </file>
 
 <file path=ppt/slides/slide1.xml><?xml version="1.0" encoding="utf-8"?>
-<p:sld xmlns:a="http://schemas.openxmlformats.org/drawingml/2006/main" xmlns:p="http://schemas.openxmlformats.org/presentationml/2006/main" xmlns:r="http://schemas.openxmlformats.org/officeDocument/2006/relationships">
+<p:sld xmlns:a="http://schemas.openxmlformats.org/drawingml/2006/main" xmlns:r="http://schemas.openxmlformats.org/officeDocument/2006/relationships" xmlns:p="http://schemas.openxmlformats.org/presentationml/2006/main">
   <p:cSld>
     <p:bg>
       <p:bgPr>
         <a:solidFill>
-          <a:srgbClr val="ffffff"/>
+          <a:srgbClr val="FFFFFF"/>
         </a:solidFill>
+        <a:effectLst/>
       </p:bgPr>
     </p:bg>
     <p:spTree>
@@ -3048,14 +3852,14 @@
         </p:nvSpPr>
         <p:spPr>
           <a:xfrm>
-            <a:off x="75960" y="222480"/>
+            <a:off x="-36056" y="205920"/>
             <a:ext cx="12152880" cy="8262000"/>
           </a:xfrm>
           <a:prstGeom prst="rect">
             <a:avLst/>
           </a:prstGeom>
           <a:solidFill>
-            <a:srgbClr val="5b9bd5"/>
+            <a:srgbClr val="5B9BD5"/>
           </a:solidFill>
           <a:ln w="12600">
             <a:noFill/>
@@ -3077,7 +3881,7 @@
             <a:avLst/>
           </a:prstGeom>
           <a:solidFill>
-            <a:srgbClr val="ffffff"/>
+            <a:srgbClr val="FFFFFF"/>
           </a:solidFill>
           <a:ln w="12600">
             <a:solidFill>
@@ -3088,6 +3892,7 @@
         </p:spPr>
         <p:txBody>
           <a:bodyPr anchor="ctr"/>
+          <a:lstStyle/>
           <a:p>
             <a:pPr algn="ctr">
               <a:lnSpc>
@@ -3122,7 +3927,7 @@
             <a:avLst/>
           </a:prstGeom>
           <a:solidFill>
-            <a:srgbClr val="ffffff"/>
+            <a:srgbClr val="FFFFFF"/>
           </a:solidFill>
           <a:ln w="12600">
             <a:solidFill>
@@ -3133,6 +3938,7 @@
         </p:spPr>
         <p:txBody>
           <a:bodyPr anchor="ctr"/>
+          <a:lstStyle/>
           <a:p>
             <a:pPr>
               <a:lnSpc>
@@ -3188,7 +3994,7 @@
             <a:avLst/>
           </a:prstGeom>
           <a:solidFill>
-            <a:srgbClr val="ffffff"/>
+            <a:srgbClr val="FFFFFF"/>
           </a:solidFill>
           <a:ln w="12600">
             <a:solidFill>
@@ -3199,6 +4005,7 @@
         </p:spPr>
         <p:txBody>
           <a:bodyPr anchor="ctr"/>
+          <a:lstStyle/>
           <a:p>
             <a:pPr algn="ctr">
               <a:lnSpc>
@@ -3233,7 +4040,7 @@
             <a:avLst/>
           </a:prstGeom>
           <a:solidFill>
-            <a:srgbClr val="ffffff"/>
+            <a:srgbClr val="FFFFFF"/>
           </a:solidFill>
           <a:ln w="12600">
             <a:solidFill>
@@ -3244,6 +4051,7 @@
         </p:spPr>
         <p:txBody>
           <a:bodyPr anchor="ctr"/>
+          <a:lstStyle/>
           <a:p>
             <a:pPr>
               <a:lnSpc>
@@ -3348,9 +4156,9 @@
           <p:nvPr/>
         </p:nvSpPr>
         <p:spPr>
-          <a:xfrm flipH="1" flipV="1">
-            <a:off x="4109040" y="5576760"/>
-            <a:ext cx="2337840" cy="41760"/>
+          <a:xfrm flipH="1">
+            <a:off x="4109040" y="5570640"/>
+            <a:ext cx="2057400" cy="6120"/>
           </a:xfrm>
           <a:prstGeom prst="line">
             <a:avLst/>
@@ -3378,7 +4186,7 @@
             <a:avLst/>
           </a:prstGeom>
           <a:solidFill>
-            <a:srgbClr val="ffffff"/>
+            <a:srgbClr val="FFFFFF"/>
           </a:solidFill>
           <a:ln w="12600">
             <a:solidFill>
@@ -3389,6 +4197,7 @@
         </p:spPr>
         <p:txBody>
           <a:bodyPr anchor="ctr"/>
+          <a:lstStyle/>
           <a:p>
             <a:pPr algn="ctr">
               <a:lnSpc>
@@ -3423,7 +4232,7 @@
             <a:avLst/>
           </a:prstGeom>
           <a:solidFill>
-            <a:srgbClr val="ffffff"/>
+            <a:srgbClr val="FFFFFF"/>
           </a:solidFill>
           <a:ln w="12600">
             <a:solidFill>
@@ -3434,6 +4243,7 @@
         </p:spPr>
         <p:txBody>
           <a:bodyPr anchor="ctr"/>
+          <a:lstStyle/>
           <a:p>
             <a:pPr>
               <a:lnSpc>
@@ -3470,7 +4280,7 @@
             <a:avLst/>
           </a:prstGeom>
           <a:solidFill>
-            <a:srgbClr val="ffffff"/>
+            <a:srgbClr val="FFFFFF"/>
           </a:solidFill>
           <a:ln w="12600">
             <a:solidFill>
@@ -3481,6 +4291,7 @@
         </p:spPr>
         <p:txBody>
           <a:bodyPr anchor="ctr"/>
+          <a:lstStyle/>
           <a:p>
             <a:pPr algn="ctr">
               <a:lnSpc>
@@ -3515,7 +4326,7 @@
             <a:avLst/>
           </a:prstGeom>
           <a:solidFill>
-            <a:srgbClr val="ffffff"/>
+            <a:srgbClr val="FFFFFF"/>
           </a:solidFill>
           <a:ln w="12600">
             <a:solidFill>
@@ -3526,6 +4337,7 @@
         </p:spPr>
         <p:txBody>
           <a:bodyPr anchor="ctr"/>
+          <a:lstStyle/>
           <a:p>
             <a:pPr>
               <a:lnSpc>
@@ -3581,7 +4393,7 @@
             <a:avLst/>
           </a:prstGeom>
           <a:solidFill>
-            <a:srgbClr val="ffffff"/>
+            <a:srgbClr val="FFFFFF"/>
           </a:solidFill>
           <a:ln w="12600">
             <a:solidFill>
@@ -3592,6 +4404,7 @@
         </p:spPr>
         <p:txBody>
           <a:bodyPr anchor="ctr"/>
+          <a:lstStyle/>
           <a:p>
             <a:pPr algn="ctr">
               <a:lnSpc>
@@ -3626,7 +4439,7 @@
             <a:avLst/>
           </a:prstGeom>
           <a:solidFill>
-            <a:srgbClr val="ffffff"/>
+            <a:srgbClr val="FFFFFF"/>
           </a:solidFill>
           <a:ln w="12600">
             <a:solidFill>
@@ -3651,7 +4464,7 @@
             <a:avLst/>
           </a:prstGeom>
           <a:solidFill>
-            <a:srgbClr val="ffffff"/>
+            <a:srgbClr val="FFFFFF"/>
           </a:solidFill>
           <a:ln w="12600">
             <a:solidFill>
@@ -3662,6 +4475,7 @@
         </p:spPr>
         <p:txBody>
           <a:bodyPr anchor="ctr"/>
+          <a:lstStyle/>
           <a:p>
             <a:pPr algn="ctr">
               <a:lnSpc>
@@ -3696,7 +4510,7 @@
             <a:avLst/>
           </a:prstGeom>
           <a:solidFill>
-            <a:srgbClr val="ffffff"/>
+            <a:srgbClr val="FFFFFF"/>
           </a:solidFill>
           <a:ln w="12600">
             <a:solidFill>
@@ -3707,6 +4521,7 @@
         </p:spPr>
         <p:txBody>
           <a:bodyPr anchor="ctr"/>
+          <a:lstStyle/>
           <a:p>
             <a:pPr>
               <a:lnSpc>
@@ -3787,7 +4602,7 @@
             <a:avLst/>
           </a:prstGeom>
           <a:solidFill>
-            <a:srgbClr val="ffffff"/>
+            <a:srgbClr val="FFFFFF"/>
           </a:solidFill>
           <a:ln w="12600">
             <a:solidFill>
@@ -3812,7 +4627,7 @@
             <a:avLst/>
           </a:prstGeom>
           <a:solidFill>
-            <a:srgbClr val="ffffff"/>
+            <a:srgbClr val="FFFFFF"/>
           </a:solidFill>
           <a:ln w="12600">
             <a:solidFill>
@@ -3837,7 +4652,7 @@
             <a:avLst/>
           </a:prstGeom>
           <a:solidFill>
-            <a:srgbClr val="ffffff"/>
+            <a:srgbClr val="FFFFFF"/>
           </a:solidFill>
           <a:ln w="12600">
             <a:solidFill>
@@ -3849,14 +4664,14 @@
       </p:sp>
       <p:sp>
         <p:nvSpPr>
-          <p:cNvPr id="97" name="CustomShape 20"/>
+          <p:cNvPr id="98" name="CustomShape 21"/>
           <p:cNvSpPr/>
           <p:nvPr/>
         </p:nvSpPr>
         <p:spPr>
           <a:xfrm>
-            <a:off x="6145560" y="5271120"/>
-            <a:ext cx="312840" cy="727920"/>
+            <a:off x="4124520" y="5230800"/>
+            <a:ext cx="271080" cy="727200"/>
           </a:xfrm>
           <a:prstGeom prst="rect">
             <a:avLst/>
@@ -3867,47 +4682,8 @@
           </a:ln>
         </p:spPr>
         <p:txBody>
-          <a:bodyPr bIns="45000" lIns="90000" rIns="90000" tIns="45000"/>
-          <a:p>
-            <a:pPr>
-              <a:lnSpc>
-                <a:spcPct val="100000"/>
-              </a:lnSpc>
-            </a:pPr>
-            <a:r>
-              <a:rPr lang="en-US">
-                <a:solidFill>
-                  <a:srgbClr val="000000"/>
-                </a:solidFill>
-                <a:latin typeface="Calibri"/>
-              </a:rPr>
-              <a:t>1</a:t>
-            </a:r>
-            <a:endParaRPr/>
-          </a:p>
-        </p:txBody>
-      </p:sp>
-      <p:sp>
-        <p:nvSpPr>
-          <p:cNvPr id="98" name="CustomShape 21"/>
-          <p:cNvSpPr/>
-          <p:nvPr/>
-        </p:nvSpPr>
-        <p:spPr>
-          <a:xfrm>
-            <a:off x="4124520" y="5230800"/>
-            <a:ext cx="271080" cy="727200"/>
-          </a:xfrm>
-          <a:prstGeom prst="rect">
-            <a:avLst/>
-          </a:prstGeom>
-          <a:noFill/>
-          <a:ln>
-            <a:noFill/>
-          </a:ln>
-        </p:spPr>
-        <p:txBody>
-          <a:bodyPr bIns="45000" lIns="90000" rIns="90000" tIns="45000" wrap="none"/>
+          <a:bodyPr wrap="none" lIns="90000" tIns="45000" rIns="90000" bIns="45000"/>
+          <a:lstStyle/>
           <a:p>
             <a:pPr>
               <a:lnSpc>
@@ -3942,7 +4718,7 @@
             <a:avLst/>
           </a:prstGeom>
           <a:solidFill>
-            <a:srgbClr val="ffffff"/>
+            <a:srgbClr val="FFFFFF"/>
           </a:solidFill>
           <a:ln w="12600">
             <a:solidFill>
@@ -3953,6 +4729,7 @@
         </p:spPr>
         <p:txBody>
           <a:bodyPr anchor="ctr"/>
+          <a:lstStyle/>
           <a:p>
             <a:pPr algn="ctr">
               <a:lnSpc>
@@ -3987,7 +4764,7 @@
             <a:avLst/>
           </a:prstGeom>
           <a:solidFill>
-            <a:srgbClr val="ffffff"/>
+            <a:srgbClr val="FFFFFF"/>
           </a:solidFill>
           <a:ln w="12600">
             <a:solidFill>
@@ -3998,6 +4775,7 @@
         </p:spPr>
         <p:txBody>
           <a:bodyPr anchor="ctr"/>
+          <a:lstStyle/>
           <a:p>
             <a:pPr>
               <a:lnSpc>
@@ -4137,7 +4915,7 @@
             <a:avLst/>
           </a:prstGeom>
           <a:solidFill>
-            <a:srgbClr val="ffffff"/>
+            <a:srgbClr val="FFFFFF"/>
           </a:solidFill>
           <a:ln w="12600">
             <a:solidFill>
@@ -4148,6 +4926,7 @@
         </p:spPr>
         <p:txBody>
           <a:bodyPr anchor="ctr"/>
+          <a:lstStyle/>
           <a:p>
             <a:pPr algn="ctr">
               <a:lnSpc>
@@ -4182,7 +4961,7 @@
             <a:avLst/>
           </a:prstGeom>
           <a:solidFill>
-            <a:srgbClr val="ffffff"/>
+            <a:srgbClr val="FFFFFF"/>
           </a:solidFill>
           <a:ln w="12600">
             <a:solidFill>
@@ -4193,6 +4972,7 @@
         </p:spPr>
         <p:txBody>
           <a:bodyPr anchor="ctr"/>
+          <a:lstStyle/>
           <a:p>
             <a:pPr>
               <a:lnSpc>
@@ -4283,7 +5063,7 @@
             <a:avLst/>
           </a:prstGeom>
           <a:solidFill>
-            <a:srgbClr val="ffffff"/>
+            <a:srgbClr val="FFFFFF"/>
           </a:solidFill>
           <a:ln w="12600">
             <a:solidFill>
@@ -4294,6 +5074,7 @@
         </p:spPr>
         <p:txBody>
           <a:bodyPr anchor="ctr"/>
+          <a:lstStyle/>
           <a:p>
             <a:pPr algn="ctr">
               <a:lnSpc>
@@ -4328,7 +5109,7 @@
             <a:avLst/>
           </a:prstGeom>
           <a:solidFill>
-            <a:srgbClr val="ffffff"/>
+            <a:srgbClr val="FFFFFF"/>
           </a:solidFill>
           <a:ln w="12600">
             <a:solidFill>
@@ -4339,6 +5120,7 @@
         </p:spPr>
         <p:txBody>
           <a:bodyPr anchor="ctr"/>
+          <a:lstStyle/>
           <a:p>
             <a:pPr>
               <a:lnSpc>
@@ -4402,7 +5184,7 @@
             <a:avLst/>
           </a:prstGeom>
           <a:solidFill>
-            <a:srgbClr val="ffffff"/>
+            <a:srgbClr val="FFFFFF"/>
           </a:solidFill>
           <a:ln w="12600">
             <a:solidFill>
@@ -4413,6 +5195,7 @@
         </p:spPr>
         <p:txBody>
           <a:bodyPr anchor="ctr"/>
+          <a:lstStyle/>
           <a:p>
             <a:pPr algn="ctr">
               <a:lnSpc>
@@ -4447,7 +5230,7 @@
             <a:avLst/>
           </a:prstGeom>
           <a:solidFill>
-            <a:srgbClr val="ffffff"/>
+            <a:srgbClr val="FFFFFF"/>
           </a:solidFill>
           <a:ln w="12600">
             <a:solidFill>
@@ -4458,6 +5241,7 @@
         </p:spPr>
         <p:txBody>
           <a:bodyPr anchor="ctr"/>
+          <a:lstStyle/>
           <a:p>
             <a:pPr>
               <a:lnSpc>
@@ -4564,7 +5348,7 @@
             <a:avLst/>
           </a:prstGeom>
           <a:solidFill>
-            <a:srgbClr val="ffffff"/>
+            <a:srgbClr val="FFFFFF"/>
           </a:solidFill>
           <a:ln w="12600">
             <a:solidFill>
@@ -4575,6 +5359,7 @@
         </p:spPr>
         <p:txBody>
           <a:bodyPr anchor="ctr"/>
+          <a:lstStyle/>
           <a:p>
             <a:pPr algn="ctr">
               <a:lnSpc>
@@ -4609,7 +5394,7 @@
             <a:avLst/>
           </a:prstGeom>
           <a:solidFill>
-            <a:srgbClr val="ffffff"/>
+            <a:srgbClr val="FFFFFF"/>
           </a:solidFill>
           <a:ln w="12600">
             <a:solidFill>
@@ -4620,6 +5405,7 @@
         </p:spPr>
         <p:txBody>
           <a:bodyPr anchor="ctr"/>
+          <a:lstStyle/>
           <a:p>
             <a:pPr>
               <a:lnSpc>
@@ -4707,7 +5493,8 @@
           </a:ln>
         </p:spPr>
         <p:txBody>
-          <a:bodyPr bIns="45000" lIns="90000" rIns="90000" tIns="45000" wrap="none"/>
+          <a:bodyPr wrap="none" lIns="90000" tIns="45000" rIns="90000" bIns="45000"/>
+          <a:lstStyle/>
           <a:p>
             <a:pPr algn="ctr">
               <a:lnSpc>
@@ -4715,9 +5502,9 @@
               </a:lnSpc>
             </a:pPr>
             <a:r>
-              <a:rPr b="1" lang="en-US" sz="3200">
-                <a:solidFill>
-                  <a:srgbClr val="ffffff"/>
+              <a:rPr lang="en-US" sz="3200" b="1">
+                <a:solidFill>
+                  <a:srgbClr val="FFFFFF"/>
                 </a:solidFill>
                 <a:latin typeface="Calibri"/>
               </a:rPr>
@@ -4770,7 +5557,8 @@
           </a:ln>
         </p:spPr>
         <p:txBody>
-          <a:bodyPr bIns="45000" lIns="90000" rIns="90000" tIns="45000" wrap="none"/>
+          <a:bodyPr wrap="none" lIns="90000" tIns="45000" rIns="90000" bIns="45000"/>
+          <a:lstStyle/>
           <a:p>
             <a:pPr>
               <a:lnSpc>
@@ -4810,7 +5598,8 @@
           </a:ln>
         </p:spPr>
         <p:txBody>
-          <a:bodyPr bIns="45000" lIns="90000" rIns="90000" tIns="45000" wrap="none"/>
+          <a:bodyPr wrap="none" lIns="90000" tIns="45000" rIns="90000" bIns="45000"/>
+          <a:lstStyle/>
           <a:p>
             <a:pPr>
               <a:lnSpc>
@@ -4872,7 +5661,8 @@
           </a:ln>
         </p:spPr>
         <p:txBody>
-          <a:bodyPr bIns="45000" lIns="90000" rIns="90000" tIns="45000" wrap="none"/>
+          <a:bodyPr wrap="none" lIns="90000" tIns="45000" rIns="90000" bIns="45000"/>
+          <a:lstStyle/>
           <a:p>
             <a:pPr>
               <a:lnSpc>
@@ -4912,7 +5702,8 @@
           </a:ln>
         </p:spPr>
         <p:txBody>
-          <a:bodyPr bIns="45000" lIns="90000" rIns="90000" tIns="45000" wrap="none"/>
+          <a:bodyPr wrap="none" lIns="90000" tIns="45000" rIns="90000" bIns="45000"/>
+          <a:lstStyle/>
           <a:p>
             <a:pPr>
               <a:lnSpc>
@@ -4962,7 +5753,7 @@
         </p:nvSpPr>
         <p:spPr>
           <a:xfrm>
-            <a:off x="8813880" y="1465200"/>
+            <a:off x="8968118" y="1454183"/>
             <a:ext cx="271080" cy="727200"/>
           </a:xfrm>
           <a:prstGeom prst="rect">
@@ -4974,15 +5765,16 @@
           </a:ln>
         </p:spPr>
         <p:txBody>
-          <a:bodyPr bIns="45000" lIns="90000" rIns="90000" tIns="45000" wrap="none"/>
-          <a:p>
-            <a:pPr>
-              <a:lnSpc>
-                <a:spcPct val="100000"/>
-              </a:lnSpc>
-            </a:pPr>
-            <a:r>
-              <a:rPr lang="en-US">
+          <a:bodyPr wrap="none" lIns="90000" tIns="45000" rIns="90000" bIns="45000"/>
+          <a:lstStyle/>
+          <a:p>
+            <a:pPr>
+              <a:lnSpc>
+                <a:spcPct val="100000"/>
+              </a:lnSpc>
+            </a:pPr>
+            <a:r>
+              <a:rPr lang="en-US" dirty="0">
                 <a:solidFill>
                   <a:srgbClr val="000000"/>
                 </a:solidFill>
@@ -4990,7 +5782,7 @@
               </a:rPr>
               <a:t>1</a:t>
             </a:r>
-            <a:endParaRPr/>
+            <a:endParaRPr dirty="0"/>
           </a:p>
         </p:txBody>
       </p:sp>
@@ -5014,7 +5806,8 @@
           </a:ln>
         </p:spPr>
         <p:txBody>
-          <a:bodyPr bIns="45000" lIns="90000" rIns="90000" tIns="45000" wrap="none"/>
+          <a:bodyPr wrap="none" lIns="90000" tIns="45000" rIns="90000" bIns="45000"/>
+          <a:lstStyle/>
           <a:p>
             <a:pPr>
               <a:lnSpc>
@@ -5049,7 +5842,7 @@
             <a:avLst/>
           </a:prstGeom>
           <a:solidFill>
-            <a:srgbClr val="ffffff"/>
+            <a:srgbClr val="FFFFFF"/>
           </a:solidFill>
           <a:ln w="12600">
             <a:solidFill>
@@ -5060,6 +5853,7 @@
         </p:spPr>
         <p:txBody>
           <a:bodyPr anchor="ctr"/>
+          <a:lstStyle/>
           <a:p>
             <a:pPr>
               <a:lnSpc>
@@ -5171,7 +5965,7 @@
             <a:avLst/>
           </a:prstGeom>
           <a:solidFill>
-            <a:srgbClr val="ffffff"/>
+            <a:srgbClr val="FFFFFF"/>
           </a:solidFill>
           <a:ln w="12600">
             <a:solidFill>
@@ -5182,6 +5976,7 @@
         </p:spPr>
         <p:txBody>
           <a:bodyPr anchor="ctr"/>
+          <a:lstStyle/>
           <a:p>
             <a:pPr>
               <a:lnSpc>
@@ -5328,7 +6123,8 @@
           </a:ln>
         </p:spPr>
         <p:txBody>
-          <a:bodyPr bIns="45000" lIns="90000" rIns="90000" tIns="45000"/>
+          <a:bodyPr lIns="90000" tIns="45000" rIns="90000" bIns="45000"/>
+          <a:lstStyle/>
           <a:p>
             <a:pPr>
               <a:lnSpc>
@@ -5356,7 +6152,7 @@
         </p:nvSpPr>
         <p:spPr>
           <a:xfrm>
-            <a:off x="5872320" y="1680480"/>
+            <a:off x="5729099" y="1680480"/>
             <a:ext cx="299880" cy="727920"/>
           </a:xfrm>
           <a:prstGeom prst="rect">
@@ -5368,15 +6164,16 @@
           </a:ln>
         </p:spPr>
         <p:txBody>
-          <a:bodyPr bIns="45000" lIns="90000" rIns="90000" tIns="45000"/>
-          <a:p>
-            <a:pPr>
-              <a:lnSpc>
-                <a:spcPct val="100000"/>
-              </a:lnSpc>
-            </a:pPr>
-            <a:r>
-              <a:rPr lang="en-US">
+          <a:bodyPr lIns="90000" tIns="45000" rIns="90000" bIns="45000"/>
+          <a:lstStyle/>
+          <a:p>
+            <a:pPr>
+              <a:lnSpc>
+                <a:spcPct val="100000"/>
+              </a:lnSpc>
+            </a:pPr>
+            <a:r>
+              <a:rPr lang="en-US" dirty="0">
                 <a:solidFill>
                   <a:srgbClr val="000000"/>
                 </a:solidFill>
@@ -5384,7 +6181,7 @@
               </a:rPr>
               <a:t>1</a:t>
             </a:r>
-            <a:endParaRPr/>
+            <a:endParaRPr dirty="0"/>
           </a:p>
         </p:txBody>
       </p:sp>
@@ -5403,7 +6200,7 @@
             <a:avLst/>
           </a:prstGeom>
           <a:solidFill>
-            <a:srgbClr val="ffffff"/>
+            <a:srgbClr val="FFFFFF"/>
           </a:solidFill>
           <a:ln w="12600">
             <a:solidFill>
@@ -5414,6 +6211,7 @@
         </p:spPr>
         <p:txBody>
           <a:bodyPr anchor="ctr"/>
+          <a:lstStyle/>
           <a:p>
             <a:pPr>
               <a:lnSpc>
@@ -5449,25 +6247,144 @@
             <a:endParaRPr/>
           </a:p>
         </p:txBody>
+      </p:sp>
+      <p:sp>
+        <p:nvSpPr>
+          <p:cNvPr id="49" name="CustomShape 20"/>
+          <p:cNvSpPr/>
+          <p:nvPr/>
+        </p:nvSpPr>
+        <p:spPr>
+          <a:xfrm>
+            <a:off x="5902781" y="5206680"/>
+            <a:ext cx="312840" cy="727920"/>
+          </a:xfrm>
+          <a:prstGeom prst="rect">
+            <a:avLst/>
+          </a:prstGeom>
+          <a:noFill/>
+          <a:ln>
+            <a:noFill/>
+          </a:ln>
+        </p:spPr>
+        <p:txBody>
+          <a:bodyPr lIns="90000" tIns="45000" rIns="90000" bIns="45000"/>
+          <a:lstStyle/>
+          <a:p>
+            <a:pPr>
+              <a:lnSpc>
+                <a:spcPct val="100000"/>
+              </a:lnSpc>
+            </a:pPr>
+            <a:r>
+              <a:rPr lang="en-US" dirty="0">
+                <a:solidFill>
+                  <a:srgbClr val="000000"/>
+                </a:solidFill>
+                <a:latin typeface="Calibri"/>
+              </a:rPr>
+              <a:t>1</a:t>
+            </a:r>
+            <a:endParaRPr dirty="0"/>
+          </a:p>
+        </p:txBody>
+      </p:sp>
+      <p:sp>
+        <p:nvSpPr>
+          <p:cNvPr id="51" name="CustomShape 18"/>
+          <p:cNvSpPr/>
+          <p:nvPr/>
+        </p:nvSpPr>
+        <p:spPr>
+          <a:xfrm>
+            <a:off x="6145027" y="5457383"/>
+            <a:ext cx="300240" cy="252000"/>
+          </a:xfrm>
+          <a:prstGeom prst="diamond">
+            <a:avLst/>
+          </a:prstGeom>
+          <a:solidFill>
+            <a:srgbClr val="FFFFFF"/>
+          </a:solidFill>
+          <a:ln w="12600">
+            <a:solidFill>
+              <a:srgbClr val="000000"/>
+            </a:solidFill>
+            <a:miter/>
+          </a:ln>
+        </p:spPr>
+      </p:sp>
+      <p:sp>
+        <p:nvSpPr>
+          <p:cNvPr id="52" name="CustomShape 18"/>
+          <p:cNvSpPr/>
+          <p:nvPr/>
+        </p:nvSpPr>
+        <p:spPr>
+          <a:xfrm>
+            <a:off x="5890177" y="1907640"/>
+            <a:ext cx="300240" cy="252000"/>
+          </a:xfrm>
+          <a:prstGeom prst="diamond">
+            <a:avLst/>
+          </a:prstGeom>
+          <a:solidFill>
+            <a:srgbClr val="FFFFFF"/>
+          </a:solidFill>
+          <a:ln w="12600">
+            <a:solidFill>
+              <a:srgbClr val="000000"/>
+            </a:solidFill>
+            <a:miter/>
+          </a:ln>
+        </p:spPr>
+      </p:sp>
+      <p:sp>
+        <p:nvSpPr>
+          <p:cNvPr id="53" name="CustomShape 18"/>
+          <p:cNvSpPr/>
+          <p:nvPr/>
+        </p:nvSpPr>
+        <p:spPr>
+          <a:xfrm>
+            <a:off x="8796257" y="1718640"/>
+            <a:ext cx="300240" cy="252000"/>
+          </a:xfrm>
+          <a:prstGeom prst="diamond">
+            <a:avLst/>
+          </a:prstGeom>
+          <a:solidFill>
+            <a:srgbClr val="FFFFFF"/>
+          </a:solidFill>
+          <a:ln w="12600">
+            <a:solidFill>
+              <a:srgbClr val="000000"/>
+            </a:solidFill>
+            <a:miter/>
+          </a:ln>
+        </p:spPr>
       </p:sp>
     </p:spTree>
   </p:cSld>
+  <p:clrMapOvr>
+    <a:masterClrMapping/>
+  </p:clrMapOvr>
   <p:timing>
     <p:tnLst>
       <p:par>
-        <p:cTn dur="indefinite" id="1" nodeType="tmRoot" restart="never">
+        <p:cTn id="1" dur="indefinite" restart="never" nodeType="tmRoot">
           <p:childTnLst>
             <p:seq>
               <p:cTn id="2" nodeType="mainSeq"/>
               <p:prevCondLst>
-                <p:cond delay="0" evt="onPrev">
+                <p:cond evt="onPrev" delay="0">
                   <p:tgtEl>
                     <p:sldTgt/>
                   </p:tgtEl>
                 </p:cond>
               </p:prevCondLst>
               <p:nextCondLst>
-                <p:cond delay="0" evt="onNext">
+                <p:cond evt="onNext" delay="0">
                   <p:tgtEl>
                     <p:sldTgt/>
                   </p:tgtEl>
@@ -5702,6 +6619,8 @@
       </a:bgFillStyleLst>
     </a:fmtScheme>
   </a:themeElements>
+  <a:objectDefaults/>
+  <a:extraClrSchemeLst/>
 </a:theme>
 </file>
 
@@ -5925,5 +6844,7 @@
       </a:bgFillStyleLst>
     </a:fmtScheme>
   </a:themeElements>
+  <a:objectDefaults/>
+  <a:extraClrSchemeLst/>
 </a:theme>
 </file>
</xml_diff>